<commit_message>
vault backup: 2025-11-16 23:03:18
</commit_message>
<xml_diff>
--- a/material/PRESENTACION/cienciadedatosaplicada_investigacion.pptx
+++ b/material/PRESENTACION/cienciadedatosaplicada_investigacion.pptx
@@ -132,6 +132,2057 @@
   <p188:author id="{F41D8B98-483F-74EF-7ECF-E3886A2D2BF2}" name="Eric Silva Latorre" initials="ES" userId="74806c10bc288813" providerId="Windows Live"/>
   <p188:author id="{FB1660F4-BA9A-82B8-C334-CF91C75A5656}" name="Ruth Marcela Espinosa Sarmiento" initials="RS" userId="S::ruth.espinosa@unab.cl::2acad1b5-36c7-4a86-bd14-a01055d811d0" providerId="AD"/>
 </p188:authorLst>
+</file>
+
+<file path=ppt/charts/chart1.xml><?xml version="1.0" encoding="utf-8"?>
+<c:chartSpace xmlns:c="http://schemas.openxmlformats.org/drawingml/2006/chart" xmlns:a="http://schemas.openxmlformats.org/drawingml/2006/main" xmlns:r="http://schemas.openxmlformats.org/officeDocument/2006/relationships" xmlns:c16r2="http://schemas.microsoft.com/office/drawing/2015/06/chart">
+  <c:date1904 val="0"/>
+  <c:lang val="es-ES"/>
+  <c:roundedCorners val="0"/>
+  <mc:AlternateContent xmlns:mc="http://schemas.openxmlformats.org/markup-compatibility/2006">
+    <mc:Choice xmlns:c14="http://schemas.microsoft.com/office/drawing/2007/8/2/chart" Requires="c14">
+      <c14:style val="102"/>
+    </mc:Choice>
+    <mc:Fallback>
+      <c:style val="2"/>
+    </mc:Fallback>
+  </mc:AlternateContent>
+  <c:chart>
+    <c:title>
+      <c:overlay val="0"/>
+      <c:spPr>
+        <a:noFill/>
+        <a:ln>
+          <a:noFill/>
+        </a:ln>
+        <a:effectLst/>
+      </c:spPr>
+      <c:txPr>
+        <a:bodyPr rot="0" spcFirstLastPara="1" vertOverflow="ellipsis" vert="horz" wrap="square" anchor="ctr" anchorCtr="1"/>
+        <a:lstStyle/>
+        <a:p>
+          <a:pPr>
+            <a:defRPr sz="1862" b="0" i="0" u="none" strike="noStrike" kern="1200" spc="0" baseline="0">
+              <a:solidFill>
+                <a:schemeClr val="tx1">
+                  <a:lumMod val="65000"/>
+                  <a:lumOff val="35000"/>
+                </a:schemeClr>
+              </a:solidFill>
+              <a:latin typeface="+mn-lt"/>
+              <a:ea typeface="+mn-ea"/>
+              <a:cs typeface="+mn-cs"/>
+            </a:defRPr>
+          </a:pPr>
+          <a:endParaRPr lang="es-CL"/>
+        </a:p>
+      </c:txPr>
+    </c:title>
+    <c:autoTitleDeleted val="0"/>
+    <c:plotArea>
+      <c:layout/>
+      <c:barChart>
+        <c:barDir val="bar"/>
+        <c:grouping val="stacked"/>
+        <c:varyColors val="0"/>
+        <c:ser>
+          <c:idx val="0"/>
+          <c:order val="0"/>
+          <c:tx>
+            <c:strRef>
+              <c:f>Hoja1!$B$1</c:f>
+              <c:strCache>
+                <c:ptCount val="1"/>
+                <c:pt idx="0">
+                  <c:v>Importancia</c:v>
+                </c:pt>
+              </c:strCache>
+            </c:strRef>
+          </c:tx>
+          <c:spPr>
+            <a:solidFill>
+              <a:schemeClr val="accent1"/>
+            </a:solidFill>
+            <a:ln>
+              <a:noFill/>
+            </a:ln>
+            <a:effectLst/>
+          </c:spPr>
+          <c:invertIfNegative val="0"/>
+          <c:cat>
+            <c:strRef>
+              <c:f>Hoja1!$A$2:$A$10</c:f>
+              <c:strCache>
+                <c:ptCount val="9"/>
+                <c:pt idx="0">
+                  <c:v>Sexo</c:v>
+                </c:pt>
+                <c:pt idx="1">
+                  <c:v>Diarrea</c:v>
+                </c:pt>
+                <c:pt idx="2">
+                  <c:v>Condición General Comprometida</c:v>
+                </c:pt>
+                <c:pt idx="3">
+                  <c:v>Ecografía Sugestiva</c:v>
+                </c:pt>
+                <c:pt idx="4">
+                  <c:v>Anemia</c:v>
+                </c:pt>
+                <c:pt idx="5">
+                  <c:v>Masa Rectal Palpable</c:v>
+                </c:pt>
+                <c:pt idx="6">
+                  <c:v>Edad</c:v>
+                </c:pt>
+                <c:pt idx="7">
+                  <c:v>Tomografía Computarizada</c:v>
+                </c:pt>
+                <c:pt idx="8">
+                  <c:v>Sangrado Gastrointestinal</c:v>
+                </c:pt>
+              </c:strCache>
+            </c:strRef>
+          </c:cat>
+          <c:val>
+            <c:numRef>
+              <c:f>Hoja1!$B$2:$B$10</c:f>
+              <c:numCache>
+                <c:formatCode>General</c:formatCode>
+                <c:ptCount val="9"/>
+                <c:pt idx="0">
+                  <c:v>5.5</c:v>
+                </c:pt>
+                <c:pt idx="1">
+                  <c:v>6.3</c:v>
+                </c:pt>
+                <c:pt idx="2">
+                  <c:v>6.8</c:v>
+                </c:pt>
+                <c:pt idx="3">
+                  <c:v>7.2</c:v>
+                </c:pt>
+                <c:pt idx="4">
+                  <c:v>7.5</c:v>
+                </c:pt>
+                <c:pt idx="5">
+                  <c:v>7.9</c:v>
+                </c:pt>
+                <c:pt idx="6">
+                  <c:v>8.5</c:v>
+                </c:pt>
+                <c:pt idx="7">
+                  <c:v>8.8000000000000007</c:v>
+                </c:pt>
+                <c:pt idx="8">
+                  <c:v>9.1999999999999993</c:v>
+                </c:pt>
+              </c:numCache>
+            </c:numRef>
+          </c:val>
+          <c:extLst>
+            <c:ext xmlns:c16="http://schemas.microsoft.com/office/drawing/2014/chart" uri="{C3380CC4-5D6E-409C-BE32-E72D297353CC}">
+              <c16:uniqueId val="{00000000-7120-467C-BF7F-9498318AFAA3}"/>
+            </c:ext>
+          </c:extLst>
+        </c:ser>
+        <c:dLbls>
+          <c:showLegendKey val="0"/>
+          <c:showVal val="0"/>
+          <c:showCatName val="0"/>
+          <c:showSerName val="0"/>
+          <c:showPercent val="0"/>
+          <c:showBubbleSize val="0"/>
+        </c:dLbls>
+        <c:gapWidth val="150"/>
+        <c:overlap val="100"/>
+        <c:axId val="582373391"/>
+        <c:axId val="582373871"/>
+      </c:barChart>
+      <c:catAx>
+        <c:axId val="582373391"/>
+        <c:scaling>
+          <c:orientation val="minMax"/>
+        </c:scaling>
+        <c:delete val="0"/>
+        <c:axPos val="l"/>
+        <c:numFmt formatCode="General" sourceLinked="1"/>
+        <c:majorTickMark val="none"/>
+        <c:minorTickMark val="none"/>
+        <c:tickLblPos val="nextTo"/>
+        <c:spPr>
+          <a:noFill/>
+          <a:ln w="9525" cap="flat" cmpd="sng" algn="ctr">
+            <a:solidFill>
+              <a:schemeClr val="tx1">
+                <a:lumMod val="15000"/>
+                <a:lumOff val="85000"/>
+              </a:schemeClr>
+            </a:solidFill>
+            <a:round/>
+          </a:ln>
+          <a:effectLst/>
+        </c:spPr>
+        <c:txPr>
+          <a:bodyPr rot="-60000000" spcFirstLastPara="1" vertOverflow="ellipsis" vert="horz" wrap="square" anchor="ctr" anchorCtr="1"/>
+          <a:lstStyle/>
+          <a:p>
+            <a:pPr>
+              <a:defRPr sz="1197" b="0" i="0" u="none" strike="noStrike" kern="1200" baseline="0">
+                <a:solidFill>
+                  <a:schemeClr val="tx1">
+                    <a:lumMod val="65000"/>
+                    <a:lumOff val="35000"/>
+                  </a:schemeClr>
+                </a:solidFill>
+                <a:latin typeface="+mn-lt"/>
+                <a:ea typeface="+mn-ea"/>
+                <a:cs typeface="+mn-cs"/>
+              </a:defRPr>
+            </a:pPr>
+            <a:endParaRPr lang="es-CL"/>
+          </a:p>
+        </c:txPr>
+        <c:crossAx val="582373871"/>
+        <c:crosses val="autoZero"/>
+        <c:auto val="1"/>
+        <c:lblAlgn val="ctr"/>
+        <c:lblOffset val="100"/>
+        <c:noMultiLvlLbl val="0"/>
+      </c:catAx>
+      <c:valAx>
+        <c:axId val="582373871"/>
+        <c:scaling>
+          <c:orientation val="minMax"/>
+        </c:scaling>
+        <c:delete val="0"/>
+        <c:axPos val="b"/>
+        <c:majorGridlines>
+          <c:spPr>
+            <a:ln w="9525" cap="flat" cmpd="sng" algn="ctr">
+              <a:solidFill>
+                <a:schemeClr val="tx1">
+                  <a:lumMod val="15000"/>
+                  <a:lumOff val="85000"/>
+                </a:schemeClr>
+              </a:solidFill>
+              <a:round/>
+            </a:ln>
+            <a:effectLst/>
+          </c:spPr>
+        </c:majorGridlines>
+        <c:numFmt formatCode="General" sourceLinked="1"/>
+        <c:majorTickMark val="none"/>
+        <c:minorTickMark val="none"/>
+        <c:tickLblPos val="nextTo"/>
+        <c:spPr>
+          <a:noFill/>
+          <a:ln>
+            <a:noFill/>
+          </a:ln>
+          <a:effectLst/>
+        </c:spPr>
+        <c:txPr>
+          <a:bodyPr rot="-60000000" spcFirstLastPara="1" vertOverflow="ellipsis" vert="horz" wrap="square" anchor="ctr" anchorCtr="1"/>
+          <a:lstStyle/>
+          <a:p>
+            <a:pPr>
+              <a:defRPr sz="1197" b="0" i="0" u="none" strike="noStrike" kern="1200" baseline="0">
+                <a:solidFill>
+                  <a:schemeClr val="tx1">
+                    <a:lumMod val="65000"/>
+                    <a:lumOff val="35000"/>
+                  </a:schemeClr>
+                </a:solidFill>
+                <a:latin typeface="+mn-lt"/>
+                <a:ea typeface="+mn-ea"/>
+                <a:cs typeface="+mn-cs"/>
+              </a:defRPr>
+            </a:pPr>
+            <a:endParaRPr lang="es-CL"/>
+          </a:p>
+        </c:txPr>
+        <c:crossAx val="582373391"/>
+        <c:crosses val="autoZero"/>
+        <c:crossBetween val="between"/>
+      </c:valAx>
+      <c:spPr>
+        <a:noFill/>
+        <a:ln>
+          <a:noFill/>
+        </a:ln>
+        <a:effectLst/>
+      </c:spPr>
+    </c:plotArea>
+    <c:legend>
+      <c:legendPos val="b"/>
+      <c:overlay val="0"/>
+      <c:spPr>
+        <a:noFill/>
+        <a:ln>
+          <a:noFill/>
+        </a:ln>
+        <a:effectLst/>
+      </c:spPr>
+      <c:txPr>
+        <a:bodyPr rot="0" spcFirstLastPara="1" vertOverflow="ellipsis" vert="horz" wrap="square" anchor="ctr" anchorCtr="1"/>
+        <a:lstStyle/>
+        <a:p>
+          <a:pPr>
+            <a:defRPr sz="1197" b="0" i="0" u="none" strike="noStrike" kern="1200" baseline="0">
+              <a:solidFill>
+                <a:schemeClr val="tx1">
+                  <a:lumMod val="65000"/>
+                  <a:lumOff val="35000"/>
+                </a:schemeClr>
+              </a:solidFill>
+              <a:latin typeface="+mn-lt"/>
+              <a:ea typeface="+mn-ea"/>
+              <a:cs typeface="+mn-cs"/>
+            </a:defRPr>
+          </a:pPr>
+          <a:endParaRPr lang="es-CL"/>
+        </a:p>
+      </c:txPr>
+    </c:legend>
+    <c:plotVisOnly val="1"/>
+    <c:dispBlanksAs val="gap"/>
+    <c:showDLblsOverMax val="0"/>
+    <c:extLst>
+      <c:ext xmlns:c16r3="http://schemas.microsoft.com/office/drawing/2017/03/chart" uri="{56B9EC1D-385E-4148-901F-78D8002777C0}">
+        <c16r3:dataDisplayOptions16>
+          <c16r3:dispNaAsBlank val="1"/>
+        </c16r3:dataDisplayOptions16>
+      </c:ext>
+    </c:extLst>
+  </c:chart>
+  <c:spPr>
+    <a:noFill/>
+    <a:ln>
+      <a:noFill/>
+    </a:ln>
+    <a:effectLst/>
+  </c:spPr>
+  <c:txPr>
+    <a:bodyPr/>
+    <a:lstStyle/>
+    <a:p>
+      <a:pPr>
+        <a:defRPr/>
+      </a:pPr>
+      <a:endParaRPr lang="es-CL"/>
+    </a:p>
+  </c:txPr>
+  <c:externalData r:id="rId3">
+    <c:autoUpdate val="0"/>
+  </c:externalData>
+</c:chartSpace>
+</file>
+
+<file path=ppt/charts/chart2.xml><?xml version="1.0" encoding="utf-8"?>
+<c:chartSpace xmlns:c="http://schemas.openxmlformats.org/drawingml/2006/chart" xmlns:a="http://schemas.openxmlformats.org/drawingml/2006/main" xmlns:r="http://schemas.openxmlformats.org/officeDocument/2006/relationships" xmlns:c16r2="http://schemas.microsoft.com/office/drawing/2015/06/chart">
+  <c:date1904 val="0"/>
+  <c:lang val="es-ES"/>
+  <c:roundedCorners val="0"/>
+  <mc:AlternateContent xmlns:mc="http://schemas.openxmlformats.org/markup-compatibility/2006">
+    <mc:Choice xmlns:c14="http://schemas.microsoft.com/office/drawing/2007/8/2/chart" Requires="c14">
+      <c14:style val="102"/>
+    </mc:Choice>
+    <mc:Fallback>
+      <c:style val="2"/>
+    </mc:Fallback>
+  </mc:AlternateContent>
+  <c:chart>
+    <c:autoTitleDeleted val="0"/>
+    <c:plotArea>
+      <c:layout/>
+      <c:scatterChart>
+        <c:scatterStyle val="smoothMarker"/>
+        <c:varyColors val="0"/>
+        <c:ser>
+          <c:idx val="0"/>
+          <c:order val="0"/>
+          <c:tx>
+            <c:strRef>
+              <c:f>Hoja1!$B$1</c:f>
+              <c:strCache>
+                <c:ptCount val="1"/>
+                <c:pt idx="0">
+                  <c:v>Modelo_Completo</c:v>
+                </c:pt>
+              </c:strCache>
+            </c:strRef>
+          </c:tx>
+          <c:spPr>
+            <a:ln w="38100" cap="rnd">
+              <a:solidFill>
+                <a:schemeClr val="accent4">
+                  <a:lumMod val="75000"/>
+                </a:schemeClr>
+              </a:solidFill>
+              <a:round/>
+            </a:ln>
+            <a:effectLst/>
+          </c:spPr>
+          <c:marker>
+            <c:symbol val="none"/>
+          </c:marker>
+          <c:xVal>
+            <c:strRef>
+              <c:f>Hoja1!$A$2:$A$15</c:f>
+              <c:strCache>
+                <c:ptCount val="14"/>
+                <c:pt idx="0">
+                  <c:v>00</c:v>
+                </c:pt>
+                <c:pt idx="1">
+                  <c:v>05</c:v>
+                </c:pt>
+                <c:pt idx="2">
+                  <c:v>10</c:v>
+                </c:pt>
+                <c:pt idx="3">
+                  <c:v>15</c:v>
+                </c:pt>
+                <c:pt idx="4">
+                  <c:v>20</c:v>
+                </c:pt>
+                <c:pt idx="5">
+                  <c:v>25</c:v>
+                </c:pt>
+                <c:pt idx="6">
+                  <c:v>30</c:v>
+                </c:pt>
+                <c:pt idx="7">
+                  <c:v>40</c:v>
+                </c:pt>
+                <c:pt idx="8">
+                  <c:v>50</c:v>
+                </c:pt>
+                <c:pt idx="9">
+                  <c:v>60</c:v>
+                </c:pt>
+                <c:pt idx="10">
+                  <c:v>70</c:v>
+                </c:pt>
+                <c:pt idx="11">
+                  <c:v>80</c:v>
+                </c:pt>
+                <c:pt idx="12">
+                  <c:v>90</c:v>
+                </c:pt>
+                <c:pt idx="13">
+                  <c:v>00</c:v>
+                </c:pt>
+              </c:strCache>
+            </c:strRef>
+          </c:xVal>
+          <c:yVal>
+            <c:numRef>
+              <c:f>Hoja1!$B$2:$B$15</c:f>
+              <c:numCache>
+                <c:formatCode>#,##0.00</c:formatCode>
+                <c:ptCount val="14"/>
+                <c:pt idx="0">
+                  <c:v>0</c:v>
+                </c:pt>
+                <c:pt idx="1">
+                  <c:v>0.35</c:v>
+                </c:pt>
+                <c:pt idx="2">
+                  <c:v>0.35</c:v>
+                </c:pt>
+                <c:pt idx="3">
+                  <c:v>0.68</c:v>
+                </c:pt>
+                <c:pt idx="4">
+                  <c:v>0.76</c:v>
+                </c:pt>
+                <c:pt idx="5">
+                  <c:v>0.81</c:v>
+                </c:pt>
+                <c:pt idx="6">
+                  <c:v>0.85</c:v>
+                </c:pt>
+                <c:pt idx="7">
+                  <c:v>0.9</c:v>
+                </c:pt>
+                <c:pt idx="8">
+                  <c:v>0.93</c:v>
+                </c:pt>
+                <c:pt idx="9">
+                  <c:v>0.95</c:v>
+                </c:pt>
+                <c:pt idx="10">
+                  <c:v>0.97</c:v>
+                </c:pt>
+                <c:pt idx="11">
+                  <c:v>0.98</c:v>
+                </c:pt>
+                <c:pt idx="12">
+                  <c:v>0.99</c:v>
+                </c:pt>
+                <c:pt idx="13">
+                  <c:v>1</c:v>
+                </c:pt>
+              </c:numCache>
+            </c:numRef>
+          </c:yVal>
+          <c:smooth val="1"/>
+          <c:extLst>
+            <c:ext xmlns:c16="http://schemas.microsoft.com/office/drawing/2014/chart" uri="{C3380CC4-5D6E-409C-BE32-E72D297353CC}">
+              <c16:uniqueId val="{00000000-EBC7-4382-8B68-04897E810A6E}"/>
+            </c:ext>
+          </c:extLst>
+        </c:ser>
+        <c:ser>
+          <c:idx val="1"/>
+          <c:order val="1"/>
+          <c:tx>
+            <c:strRef>
+              <c:f>Hoja1!$C$1</c:f>
+              <c:strCache>
+                <c:ptCount val="1"/>
+                <c:pt idx="0">
+                  <c:v>Modelo_Simplificado</c:v>
+                </c:pt>
+              </c:strCache>
+            </c:strRef>
+          </c:tx>
+          <c:spPr>
+            <a:ln w="38100" cap="rnd">
+              <a:solidFill>
+                <a:schemeClr val="accent2"/>
+              </a:solidFill>
+              <a:round/>
+            </a:ln>
+            <a:effectLst/>
+          </c:spPr>
+          <c:marker>
+            <c:symbol val="none"/>
+          </c:marker>
+          <c:xVal>
+            <c:strRef>
+              <c:f>Hoja1!$A$2:$A$15</c:f>
+              <c:strCache>
+                <c:ptCount val="14"/>
+                <c:pt idx="0">
+                  <c:v>00</c:v>
+                </c:pt>
+                <c:pt idx="1">
+                  <c:v>05</c:v>
+                </c:pt>
+                <c:pt idx="2">
+                  <c:v>10</c:v>
+                </c:pt>
+                <c:pt idx="3">
+                  <c:v>15</c:v>
+                </c:pt>
+                <c:pt idx="4">
+                  <c:v>20</c:v>
+                </c:pt>
+                <c:pt idx="5">
+                  <c:v>25</c:v>
+                </c:pt>
+                <c:pt idx="6">
+                  <c:v>30</c:v>
+                </c:pt>
+                <c:pt idx="7">
+                  <c:v>40</c:v>
+                </c:pt>
+                <c:pt idx="8">
+                  <c:v>50</c:v>
+                </c:pt>
+                <c:pt idx="9">
+                  <c:v>60</c:v>
+                </c:pt>
+                <c:pt idx="10">
+                  <c:v>70</c:v>
+                </c:pt>
+                <c:pt idx="11">
+                  <c:v>80</c:v>
+                </c:pt>
+                <c:pt idx="12">
+                  <c:v>90</c:v>
+                </c:pt>
+                <c:pt idx="13">
+                  <c:v>00</c:v>
+                </c:pt>
+              </c:strCache>
+            </c:strRef>
+          </c:xVal>
+          <c:yVal>
+            <c:numRef>
+              <c:f>Hoja1!$C$2:$C$15</c:f>
+              <c:numCache>
+                <c:formatCode>0.00</c:formatCode>
+                <c:ptCount val="14"/>
+                <c:pt idx="0">
+                  <c:v>0</c:v>
+                </c:pt>
+                <c:pt idx="1">
+                  <c:v>0.3</c:v>
+                </c:pt>
+                <c:pt idx="2">
+                  <c:v>0.48</c:v>
+                </c:pt>
+                <c:pt idx="3">
+                  <c:v>0.6</c:v>
+                </c:pt>
+                <c:pt idx="4">
+                  <c:v>0.68</c:v>
+                </c:pt>
+                <c:pt idx="5">
+                  <c:v>0.74</c:v>
+                </c:pt>
+                <c:pt idx="6">
+                  <c:v>0.78</c:v>
+                </c:pt>
+                <c:pt idx="7">
+                  <c:v>0.84</c:v>
+                </c:pt>
+                <c:pt idx="8">
+                  <c:v>0.88</c:v>
+                </c:pt>
+                <c:pt idx="9">
+                  <c:v>0.91</c:v>
+                </c:pt>
+                <c:pt idx="10">
+                  <c:v>0.94</c:v>
+                </c:pt>
+                <c:pt idx="11">
+                  <c:v>0.96</c:v>
+                </c:pt>
+                <c:pt idx="12">
+                  <c:v>0.98</c:v>
+                </c:pt>
+                <c:pt idx="13">
+                  <c:v>1</c:v>
+                </c:pt>
+              </c:numCache>
+            </c:numRef>
+          </c:yVal>
+          <c:smooth val="1"/>
+          <c:extLst>
+            <c:ext xmlns:c16="http://schemas.microsoft.com/office/drawing/2014/chart" uri="{C3380CC4-5D6E-409C-BE32-E72D297353CC}">
+              <c16:uniqueId val="{00000001-EBC7-4382-8B68-04897E810A6E}"/>
+            </c:ext>
+          </c:extLst>
+        </c:ser>
+        <c:ser>
+          <c:idx val="2"/>
+          <c:order val="2"/>
+          <c:tx>
+            <c:strRef>
+              <c:f>Hoja1!$D$1</c:f>
+              <c:strCache>
+                <c:ptCount val="1"/>
+                <c:pt idx="0">
+                  <c:v>Azar</c:v>
+                </c:pt>
+              </c:strCache>
+            </c:strRef>
+          </c:tx>
+          <c:spPr>
+            <a:ln w="25400" cap="rnd">
+              <a:solidFill>
+                <a:schemeClr val="bg2">
+                  <a:lumMod val="75000"/>
+                </a:schemeClr>
+              </a:solidFill>
+              <a:prstDash val="sysDot"/>
+              <a:round/>
+            </a:ln>
+            <a:effectLst/>
+          </c:spPr>
+          <c:marker>
+            <c:symbol val="none"/>
+          </c:marker>
+          <c:xVal>
+            <c:strRef>
+              <c:f>Hoja1!$A$2:$A$15</c:f>
+              <c:strCache>
+                <c:ptCount val="14"/>
+                <c:pt idx="0">
+                  <c:v>00</c:v>
+                </c:pt>
+                <c:pt idx="1">
+                  <c:v>05</c:v>
+                </c:pt>
+                <c:pt idx="2">
+                  <c:v>10</c:v>
+                </c:pt>
+                <c:pt idx="3">
+                  <c:v>15</c:v>
+                </c:pt>
+                <c:pt idx="4">
+                  <c:v>20</c:v>
+                </c:pt>
+                <c:pt idx="5">
+                  <c:v>25</c:v>
+                </c:pt>
+                <c:pt idx="6">
+                  <c:v>30</c:v>
+                </c:pt>
+                <c:pt idx="7">
+                  <c:v>40</c:v>
+                </c:pt>
+                <c:pt idx="8">
+                  <c:v>50</c:v>
+                </c:pt>
+                <c:pt idx="9">
+                  <c:v>60</c:v>
+                </c:pt>
+                <c:pt idx="10">
+                  <c:v>70</c:v>
+                </c:pt>
+                <c:pt idx="11">
+                  <c:v>80</c:v>
+                </c:pt>
+                <c:pt idx="12">
+                  <c:v>90</c:v>
+                </c:pt>
+                <c:pt idx="13">
+                  <c:v>00</c:v>
+                </c:pt>
+              </c:strCache>
+            </c:strRef>
+          </c:xVal>
+          <c:yVal>
+            <c:numRef>
+              <c:f>Hoja1!$D$2:$D$15</c:f>
+              <c:numCache>
+                <c:formatCode>0.00</c:formatCode>
+                <c:ptCount val="14"/>
+                <c:pt idx="0">
+                  <c:v>0</c:v>
+                </c:pt>
+                <c:pt idx="1">
+                  <c:v>0.05</c:v>
+                </c:pt>
+                <c:pt idx="2">
+                  <c:v>0.1</c:v>
+                </c:pt>
+                <c:pt idx="3">
+                  <c:v>0.15</c:v>
+                </c:pt>
+                <c:pt idx="4">
+                  <c:v>0.2</c:v>
+                </c:pt>
+                <c:pt idx="5">
+                  <c:v>0.25</c:v>
+                </c:pt>
+                <c:pt idx="6">
+                  <c:v>0.3</c:v>
+                </c:pt>
+                <c:pt idx="7">
+                  <c:v>0.4</c:v>
+                </c:pt>
+                <c:pt idx="8">
+                  <c:v>0.5</c:v>
+                </c:pt>
+                <c:pt idx="9">
+                  <c:v>0.6</c:v>
+                </c:pt>
+                <c:pt idx="10">
+                  <c:v>0.7</c:v>
+                </c:pt>
+                <c:pt idx="11">
+                  <c:v>0.8</c:v>
+                </c:pt>
+                <c:pt idx="12">
+                  <c:v>0.9</c:v>
+                </c:pt>
+                <c:pt idx="13">
+                  <c:v>1</c:v>
+                </c:pt>
+              </c:numCache>
+            </c:numRef>
+          </c:yVal>
+          <c:smooth val="1"/>
+          <c:extLst>
+            <c:ext xmlns:c16="http://schemas.microsoft.com/office/drawing/2014/chart" uri="{C3380CC4-5D6E-409C-BE32-E72D297353CC}">
+              <c16:uniqueId val="{00000002-EBC7-4382-8B68-04897E810A6E}"/>
+            </c:ext>
+          </c:extLst>
+        </c:ser>
+        <c:dLbls>
+          <c:showLegendKey val="0"/>
+          <c:showVal val="0"/>
+          <c:showCatName val="0"/>
+          <c:showSerName val="0"/>
+          <c:showPercent val="0"/>
+          <c:showBubbleSize val="0"/>
+        </c:dLbls>
+        <c:axId val="237147935"/>
+        <c:axId val="237148415"/>
+      </c:scatterChart>
+      <c:valAx>
+        <c:axId val="237147935"/>
+        <c:scaling>
+          <c:orientation val="minMax"/>
+        </c:scaling>
+        <c:delete val="0"/>
+        <c:axPos val="b"/>
+        <c:majorGridlines>
+          <c:spPr>
+            <a:ln w="9525" cap="flat" cmpd="sng" algn="ctr">
+              <a:solidFill>
+                <a:schemeClr val="tx1">
+                  <a:lumMod val="15000"/>
+                  <a:lumOff val="85000"/>
+                </a:schemeClr>
+              </a:solidFill>
+              <a:round/>
+            </a:ln>
+            <a:effectLst/>
+          </c:spPr>
+        </c:majorGridlines>
+        <c:numFmt formatCode="@" sourceLinked="1"/>
+        <c:majorTickMark val="none"/>
+        <c:minorTickMark val="none"/>
+        <c:tickLblPos val="nextTo"/>
+        <c:spPr>
+          <a:noFill/>
+          <a:ln w="9525" cap="flat" cmpd="sng" algn="ctr">
+            <a:solidFill>
+              <a:schemeClr val="tx1">
+                <a:lumMod val="25000"/>
+                <a:lumOff val="75000"/>
+              </a:schemeClr>
+            </a:solidFill>
+            <a:round/>
+          </a:ln>
+          <a:effectLst/>
+        </c:spPr>
+        <c:txPr>
+          <a:bodyPr rot="-60000000" spcFirstLastPara="1" vertOverflow="ellipsis" vert="horz" wrap="square" anchor="ctr" anchorCtr="1"/>
+          <a:lstStyle/>
+          <a:p>
+            <a:pPr>
+              <a:defRPr sz="1197" b="0" i="0" u="none" strike="noStrike" kern="1200" baseline="0">
+                <a:solidFill>
+                  <a:schemeClr val="tx1">
+                    <a:lumMod val="65000"/>
+                    <a:lumOff val="35000"/>
+                  </a:schemeClr>
+                </a:solidFill>
+                <a:latin typeface="+mn-lt"/>
+                <a:ea typeface="+mn-ea"/>
+                <a:cs typeface="+mn-cs"/>
+              </a:defRPr>
+            </a:pPr>
+            <a:endParaRPr lang="es-CL"/>
+          </a:p>
+        </c:txPr>
+        <c:crossAx val="237148415"/>
+        <c:crosses val="autoZero"/>
+        <c:crossBetween val="midCat"/>
+      </c:valAx>
+      <c:valAx>
+        <c:axId val="237148415"/>
+        <c:scaling>
+          <c:orientation val="minMax"/>
+          <c:max val="1"/>
+        </c:scaling>
+        <c:delete val="0"/>
+        <c:axPos val="l"/>
+        <c:majorGridlines>
+          <c:spPr>
+            <a:ln w="9525" cap="flat" cmpd="sng" algn="ctr">
+              <a:solidFill>
+                <a:schemeClr val="tx1">
+                  <a:lumMod val="15000"/>
+                  <a:lumOff val="85000"/>
+                </a:schemeClr>
+              </a:solidFill>
+              <a:round/>
+            </a:ln>
+            <a:effectLst/>
+          </c:spPr>
+        </c:majorGridlines>
+        <c:numFmt formatCode="#,##0.00" sourceLinked="1"/>
+        <c:majorTickMark val="none"/>
+        <c:minorTickMark val="none"/>
+        <c:tickLblPos val="nextTo"/>
+        <c:spPr>
+          <a:noFill/>
+          <a:ln w="9525" cap="flat" cmpd="sng" algn="ctr">
+            <a:solidFill>
+              <a:schemeClr val="tx1">
+                <a:lumMod val="25000"/>
+                <a:lumOff val="75000"/>
+              </a:schemeClr>
+            </a:solidFill>
+            <a:round/>
+          </a:ln>
+          <a:effectLst/>
+        </c:spPr>
+        <c:txPr>
+          <a:bodyPr rot="-60000000" spcFirstLastPara="1" vertOverflow="ellipsis" vert="horz" wrap="square" anchor="ctr" anchorCtr="1"/>
+          <a:lstStyle/>
+          <a:p>
+            <a:pPr>
+              <a:defRPr sz="1197" b="0" i="0" u="none" strike="noStrike" kern="1200" baseline="0">
+                <a:solidFill>
+                  <a:schemeClr val="tx1">
+                    <a:lumMod val="65000"/>
+                    <a:lumOff val="35000"/>
+                  </a:schemeClr>
+                </a:solidFill>
+                <a:latin typeface="+mn-lt"/>
+                <a:ea typeface="+mn-ea"/>
+                <a:cs typeface="+mn-cs"/>
+              </a:defRPr>
+            </a:pPr>
+            <a:endParaRPr lang="es-CL"/>
+          </a:p>
+        </c:txPr>
+        <c:crossAx val="237147935"/>
+        <c:crosses val="autoZero"/>
+        <c:crossBetween val="midCat"/>
+      </c:valAx>
+      <c:spPr>
+        <a:noFill/>
+        <a:ln>
+          <a:noFill/>
+        </a:ln>
+        <a:effectLst/>
+      </c:spPr>
+    </c:plotArea>
+    <c:plotVisOnly val="1"/>
+    <c:dispBlanksAs val="gap"/>
+    <c:showDLblsOverMax val="0"/>
+    <c:extLst>
+      <c:ext xmlns:c16r3="http://schemas.microsoft.com/office/drawing/2017/03/chart" uri="{56B9EC1D-385E-4148-901F-78D8002777C0}">
+        <c16r3:dataDisplayOptions16>
+          <c16r3:dispNaAsBlank val="1"/>
+        </c16r3:dataDisplayOptions16>
+      </c:ext>
+    </c:extLst>
+  </c:chart>
+  <c:spPr>
+    <a:noFill/>
+    <a:ln>
+      <a:noFill/>
+    </a:ln>
+    <a:effectLst/>
+  </c:spPr>
+  <c:txPr>
+    <a:bodyPr/>
+    <a:lstStyle/>
+    <a:p>
+      <a:pPr>
+        <a:defRPr/>
+      </a:pPr>
+      <a:endParaRPr lang="es-CL"/>
+    </a:p>
+  </c:txPr>
+  <c:externalData r:id="rId3">
+    <c:autoUpdate val="0"/>
+  </c:externalData>
+</c:chartSpace>
+</file>
+
+<file path=ppt/charts/colors1.xml><?xml version="1.0" encoding="utf-8"?>
+<cs:colorStyle xmlns:cs="http://schemas.microsoft.com/office/drawing/2012/chartStyle" xmlns:a="http://schemas.openxmlformats.org/drawingml/2006/main" meth="cycle" id="10">
+  <a:schemeClr val="accent1"/>
+  <a:schemeClr val="accent2"/>
+  <a:schemeClr val="accent3"/>
+  <a:schemeClr val="accent4"/>
+  <a:schemeClr val="accent5"/>
+  <a:schemeClr val="accent6"/>
+  <cs:variation/>
+  <cs:variation>
+    <a:lumMod val="60000"/>
+  </cs:variation>
+  <cs:variation>
+    <a:lumMod val="80000"/>
+    <a:lumOff val="20000"/>
+  </cs:variation>
+  <cs:variation>
+    <a:lumMod val="80000"/>
+  </cs:variation>
+  <cs:variation>
+    <a:lumMod val="60000"/>
+    <a:lumOff val="40000"/>
+  </cs:variation>
+  <cs:variation>
+    <a:lumMod val="50000"/>
+  </cs:variation>
+  <cs:variation>
+    <a:lumMod val="70000"/>
+    <a:lumOff val="30000"/>
+  </cs:variation>
+  <cs:variation>
+    <a:lumMod val="70000"/>
+  </cs:variation>
+  <cs:variation>
+    <a:lumMod val="50000"/>
+    <a:lumOff val="50000"/>
+  </cs:variation>
+</cs:colorStyle>
+</file>
+
+<file path=ppt/charts/colors2.xml><?xml version="1.0" encoding="utf-8"?>
+<cs:colorStyle xmlns:cs="http://schemas.microsoft.com/office/drawing/2012/chartStyle" xmlns:a="http://schemas.openxmlformats.org/drawingml/2006/main" meth="cycle" id="10">
+  <a:schemeClr val="accent1"/>
+  <a:schemeClr val="accent2"/>
+  <a:schemeClr val="accent3"/>
+  <a:schemeClr val="accent4"/>
+  <a:schemeClr val="accent5"/>
+  <a:schemeClr val="accent6"/>
+  <cs:variation/>
+  <cs:variation>
+    <a:lumMod val="60000"/>
+  </cs:variation>
+  <cs:variation>
+    <a:lumMod val="80000"/>
+    <a:lumOff val="20000"/>
+  </cs:variation>
+  <cs:variation>
+    <a:lumMod val="80000"/>
+  </cs:variation>
+  <cs:variation>
+    <a:lumMod val="60000"/>
+    <a:lumOff val="40000"/>
+  </cs:variation>
+  <cs:variation>
+    <a:lumMod val="50000"/>
+  </cs:variation>
+  <cs:variation>
+    <a:lumMod val="70000"/>
+    <a:lumOff val="30000"/>
+  </cs:variation>
+  <cs:variation>
+    <a:lumMod val="70000"/>
+  </cs:variation>
+  <cs:variation>
+    <a:lumMod val="50000"/>
+    <a:lumOff val="50000"/>
+  </cs:variation>
+</cs:colorStyle>
+</file>
+
+<file path=ppt/charts/style1.xml><?xml version="1.0" encoding="utf-8"?>
+<cs:chartStyle xmlns:cs="http://schemas.microsoft.com/office/drawing/2012/chartStyle" xmlns:a="http://schemas.openxmlformats.org/drawingml/2006/main" id="297">
+  <cs:axisTitle>
+    <cs:lnRef idx="0"/>
+    <cs:fillRef idx="0"/>
+    <cs:effectRef idx="0"/>
+    <cs:fontRef idx="minor">
+      <a:schemeClr val="tx1">
+        <a:lumMod val="65000"/>
+        <a:lumOff val="35000"/>
+      </a:schemeClr>
+    </cs:fontRef>
+    <cs:defRPr sz="1330" kern="1200"/>
+  </cs:axisTitle>
+  <cs:categoryAxis>
+    <cs:lnRef idx="0"/>
+    <cs:fillRef idx="0"/>
+    <cs:effectRef idx="0"/>
+    <cs:fontRef idx="minor">
+      <a:schemeClr val="tx1">
+        <a:lumMod val="65000"/>
+        <a:lumOff val="35000"/>
+      </a:schemeClr>
+    </cs:fontRef>
+    <cs:spPr>
+      <a:ln w="9525" cap="flat" cmpd="sng" algn="ctr">
+        <a:solidFill>
+          <a:schemeClr val="tx1">
+            <a:lumMod val="15000"/>
+            <a:lumOff val="85000"/>
+          </a:schemeClr>
+        </a:solidFill>
+        <a:round/>
+      </a:ln>
+    </cs:spPr>
+    <cs:defRPr sz="1197" kern="1200"/>
+  </cs:categoryAxis>
+  <cs:chartArea mods="allowNoFillOverride allowNoLineOverride">
+    <cs:lnRef idx="0"/>
+    <cs:fillRef idx="0"/>
+    <cs:effectRef idx="0"/>
+    <cs:fontRef idx="minor">
+      <a:schemeClr val="tx1"/>
+    </cs:fontRef>
+    <cs:spPr>
+      <a:solidFill>
+        <a:schemeClr val="bg1"/>
+      </a:solidFill>
+      <a:ln w="9525" cap="flat" cmpd="sng" algn="ctr">
+        <a:solidFill>
+          <a:schemeClr val="tx1">
+            <a:lumMod val="15000"/>
+            <a:lumOff val="85000"/>
+          </a:schemeClr>
+        </a:solidFill>
+        <a:round/>
+      </a:ln>
+    </cs:spPr>
+    <cs:defRPr sz="1330" kern="1200"/>
+  </cs:chartArea>
+  <cs:dataLabel>
+    <cs:lnRef idx="0"/>
+    <cs:fillRef idx="0"/>
+    <cs:effectRef idx="0"/>
+    <cs:fontRef idx="minor">
+      <a:schemeClr val="tx1">
+        <a:lumMod val="75000"/>
+        <a:lumOff val="25000"/>
+      </a:schemeClr>
+    </cs:fontRef>
+    <cs:defRPr sz="1197" kern="1200"/>
+  </cs:dataLabel>
+  <cs:dataLabelCallout>
+    <cs:lnRef idx="0"/>
+    <cs:fillRef idx="0"/>
+    <cs:effectRef idx="0"/>
+    <cs:fontRef idx="minor">
+      <a:schemeClr val="dk1">
+        <a:lumMod val="65000"/>
+        <a:lumOff val="35000"/>
+      </a:schemeClr>
+    </cs:fontRef>
+    <cs:spPr>
+      <a:solidFill>
+        <a:schemeClr val="lt1"/>
+      </a:solidFill>
+      <a:ln>
+        <a:solidFill>
+          <a:schemeClr val="dk1">
+            <a:lumMod val="25000"/>
+            <a:lumOff val="75000"/>
+          </a:schemeClr>
+        </a:solidFill>
+      </a:ln>
+    </cs:spPr>
+    <cs:defRPr sz="1197" kern="1200"/>
+    <cs:bodyPr rot="0" spcFirstLastPara="1" vertOverflow="clip" horzOverflow="clip" vert="horz" wrap="square" lIns="36576" tIns="18288" rIns="36576" bIns="18288" anchor="ctr" anchorCtr="1">
+      <a:spAutoFit/>
+    </cs:bodyPr>
+  </cs:dataLabelCallout>
+  <cs:dataPoint>
+    <cs:lnRef idx="0"/>
+    <cs:fillRef idx="1">
+      <cs:styleClr val="auto"/>
+    </cs:fillRef>
+    <cs:effectRef idx="0"/>
+    <cs:fontRef idx="minor">
+      <a:schemeClr val="tx1"/>
+    </cs:fontRef>
+  </cs:dataPoint>
+  <cs:dataPoint3D>
+    <cs:lnRef idx="0"/>
+    <cs:fillRef idx="1">
+      <cs:styleClr val="auto"/>
+    </cs:fillRef>
+    <cs:effectRef idx="0"/>
+    <cs:fontRef idx="minor">
+      <a:schemeClr val="tx1"/>
+    </cs:fontRef>
+  </cs:dataPoint3D>
+  <cs:dataPointLine>
+    <cs:lnRef idx="0">
+      <cs:styleClr val="auto"/>
+    </cs:lnRef>
+    <cs:fillRef idx="1"/>
+    <cs:effectRef idx="0"/>
+    <cs:fontRef idx="minor">
+      <a:schemeClr val="tx1"/>
+    </cs:fontRef>
+    <cs:spPr>
+      <a:ln w="28575" cap="rnd">
+        <a:solidFill>
+          <a:schemeClr val="phClr"/>
+        </a:solidFill>
+        <a:round/>
+      </a:ln>
+    </cs:spPr>
+  </cs:dataPointLine>
+  <cs:dataPointMarker>
+    <cs:lnRef idx="0">
+      <cs:styleClr val="auto"/>
+    </cs:lnRef>
+    <cs:fillRef idx="1">
+      <cs:styleClr val="auto"/>
+    </cs:fillRef>
+    <cs:effectRef idx="0"/>
+    <cs:fontRef idx="minor">
+      <a:schemeClr val="tx1"/>
+    </cs:fontRef>
+    <cs:spPr>
+      <a:ln w="9525">
+        <a:solidFill>
+          <a:schemeClr val="phClr"/>
+        </a:solidFill>
+      </a:ln>
+    </cs:spPr>
+  </cs:dataPointMarker>
+  <cs:dataPointMarkerLayout symbol="circle" size="5"/>
+  <cs:dataPointWireframe>
+    <cs:lnRef idx="0">
+      <cs:styleClr val="auto"/>
+    </cs:lnRef>
+    <cs:fillRef idx="1"/>
+    <cs:effectRef idx="0"/>
+    <cs:fontRef idx="minor">
+      <a:schemeClr val="tx1"/>
+    </cs:fontRef>
+    <cs:spPr>
+      <a:ln w="9525" cap="rnd">
+        <a:solidFill>
+          <a:schemeClr val="phClr"/>
+        </a:solidFill>
+        <a:round/>
+      </a:ln>
+    </cs:spPr>
+  </cs:dataPointWireframe>
+  <cs:dataTable>
+    <cs:lnRef idx="0"/>
+    <cs:fillRef idx="0"/>
+    <cs:effectRef idx="0"/>
+    <cs:fontRef idx="minor">
+      <a:schemeClr val="tx1">
+        <a:lumMod val="65000"/>
+        <a:lumOff val="35000"/>
+      </a:schemeClr>
+    </cs:fontRef>
+    <cs:spPr>
+      <a:noFill/>
+      <a:ln w="9525" cap="flat" cmpd="sng" algn="ctr">
+        <a:solidFill>
+          <a:schemeClr val="tx1">
+            <a:lumMod val="15000"/>
+            <a:lumOff val="85000"/>
+          </a:schemeClr>
+        </a:solidFill>
+        <a:round/>
+      </a:ln>
+    </cs:spPr>
+    <cs:defRPr sz="1197" kern="1200"/>
+  </cs:dataTable>
+  <cs:downBar>
+    <cs:lnRef idx="0"/>
+    <cs:fillRef idx="0"/>
+    <cs:effectRef idx="0"/>
+    <cs:fontRef idx="minor">
+      <a:schemeClr val="tx1"/>
+    </cs:fontRef>
+    <cs:spPr>
+      <a:solidFill>
+        <a:schemeClr val="dk1">
+          <a:lumMod val="75000"/>
+          <a:lumOff val="25000"/>
+        </a:schemeClr>
+      </a:solidFill>
+      <a:ln w="9525" cap="flat" cmpd="sng" algn="ctr">
+        <a:solidFill>
+          <a:schemeClr val="tx1">
+            <a:lumMod val="65000"/>
+            <a:lumOff val="35000"/>
+          </a:schemeClr>
+        </a:solidFill>
+        <a:round/>
+      </a:ln>
+    </cs:spPr>
+  </cs:downBar>
+  <cs:dropLine>
+    <cs:lnRef idx="0"/>
+    <cs:fillRef idx="0"/>
+    <cs:effectRef idx="0"/>
+    <cs:fontRef idx="minor">
+      <a:schemeClr val="tx1"/>
+    </cs:fontRef>
+    <cs:spPr>
+      <a:ln w="9525" cap="flat" cmpd="sng" algn="ctr">
+        <a:solidFill>
+          <a:schemeClr val="tx1">
+            <a:lumMod val="35000"/>
+            <a:lumOff val="65000"/>
+          </a:schemeClr>
+        </a:solidFill>
+        <a:round/>
+      </a:ln>
+    </cs:spPr>
+  </cs:dropLine>
+  <cs:errorBar>
+    <cs:lnRef idx="0"/>
+    <cs:fillRef idx="0"/>
+    <cs:effectRef idx="0"/>
+    <cs:fontRef idx="minor">
+      <a:schemeClr val="tx1"/>
+    </cs:fontRef>
+    <cs:spPr>
+      <a:ln w="9525" cap="flat" cmpd="sng" algn="ctr">
+        <a:solidFill>
+          <a:schemeClr val="tx1">
+            <a:lumMod val="65000"/>
+            <a:lumOff val="35000"/>
+          </a:schemeClr>
+        </a:solidFill>
+        <a:round/>
+      </a:ln>
+    </cs:spPr>
+  </cs:errorBar>
+  <cs:floor>
+    <cs:lnRef idx="0"/>
+    <cs:fillRef idx="0"/>
+    <cs:effectRef idx="0"/>
+    <cs:fontRef idx="minor">
+      <a:schemeClr val="tx1"/>
+    </cs:fontRef>
+    <cs:spPr>
+      <a:noFill/>
+      <a:ln>
+        <a:noFill/>
+      </a:ln>
+    </cs:spPr>
+  </cs:floor>
+  <cs:gridlineMajor>
+    <cs:lnRef idx="0"/>
+    <cs:fillRef idx="0"/>
+    <cs:effectRef idx="0"/>
+    <cs:fontRef idx="minor">
+      <a:schemeClr val="tx1"/>
+    </cs:fontRef>
+    <cs:spPr>
+      <a:ln w="9525" cap="flat" cmpd="sng" algn="ctr">
+        <a:solidFill>
+          <a:schemeClr val="tx1">
+            <a:lumMod val="15000"/>
+            <a:lumOff val="85000"/>
+          </a:schemeClr>
+        </a:solidFill>
+        <a:round/>
+      </a:ln>
+    </cs:spPr>
+  </cs:gridlineMajor>
+  <cs:gridlineMinor>
+    <cs:lnRef idx="0"/>
+    <cs:fillRef idx="0"/>
+    <cs:effectRef idx="0"/>
+    <cs:fontRef idx="minor">
+      <a:schemeClr val="tx1"/>
+    </cs:fontRef>
+    <cs:spPr>
+      <a:ln w="9525" cap="flat" cmpd="sng" algn="ctr">
+        <a:solidFill>
+          <a:schemeClr val="tx1">
+            <a:lumMod val="5000"/>
+            <a:lumOff val="95000"/>
+          </a:schemeClr>
+        </a:solidFill>
+        <a:round/>
+      </a:ln>
+    </cs:spPr>
+  </cs:gridlineMinor>
+  <cs:hiLoLine>
+    <cs:lnRef idx="0"/>
+    <cs:fillRef idx="0"/>
+    <cs:effectRef idx="0"/>
+    <cs:fontRef idx="minor">
+      <a:schemeClr val="tx1"/>
+    </cs:fontRef>
+    <cs:spPr>
+      <a:ln w="9525" cap="flat" cmpd="sng" algn="ctr">
+        <a:solidFill>
+          <a:schemeClr val="tx1">
+            <a:lumMod val="50000"/>
+            <a:lumOff val="50000"/>
+          </a:schemeClr>
+        </a:solidFill>
+        <a:round/>
+      </a:ln>
+    </cs:spPr>
+  </cs:hiLoLine>
+  <cs:leaderLine>
+    <cs:lnRef idx="0"/>
+    <cs:fillRef idx="0"/>
+    <cs:effectRef idx="0"/>
+    <cs:fontRef idx="minor">
+      <a:schemeClr val="tx1"/>
+    </cs:fontRef>
+    <cs:spPr>
+      <a:ln w="9525" cap="flat" cmpd="sng" algn="ctr">
+        <a:solidFill>
+          <a:schemeClr val="tx1">
+            <a:lumMod val="35000"/>
+            <a:lumOff val="65000"/>
+          </a:schemeClr>
+        </a:solidFill>
+        <a:round/>
+      </a:ln>
+    </cs:spPr>
+  </cs:leaderLine>
+  <cs:legend>
+    <cs:lnRef idx="0"/>
+    <cs:fillRef idx="0"/>
+    <cs:effectRef idx="0"/>
+    <cs:fontRef idx="minor">
+      <a:schemeClr val="tx1">
+        <a:lumMod val="65000"/>
+        <a:lumOff val="35000"/>
+      </a:schemeClr>
+    </cs:fontRef>
+    <cs:defRPr sz="1197" kern="1200"/>
+  </cs:legend>
+  <cs:plotArea mods="allowNoFillOverride allowNoLineOverride">
+    <cs:lnRef idx="0"/>
+    <cs:fillRef idx="0"/>
+    <cs:effectRef idx="0"/>
+    <cs:fontRef idx="minor">
+      <a:schemeClr val="tx1"/>
+    </cs:fontRef>
+  </cs:plotArea>
+  <cs:plotArea3D mods="allowNoFillOverride allowNoLineOverride">
+    <cs:lnRef idx="0"/>
+    <cs:fillRef idx="0"/>
+    <cs:effectRef idx="0"/>
+    <cs:fontRef idx="minor">
+      <a:schemeClr val="tx1"/>
+    </cs:fontRef>
+  </cs:plotArea3D>
+  <cs:seriesAxis>
+    <cs:lnRef idx="0"/>
+    <cs:fillRef idx="0"/>
+    <cs:effectRef idx="0"/>
+    <cs:fontRef idx="minor">
+      <a:schemeClr val="tx1">
+        <a:lumMod val="65000"/>
+        <a:lumOff val="35000"/>
+      </a:schemeClr>
+    </cs:fontRef>
+    <cs:defRPr sz="1197" kern="1200"/>
+  </cs:seriesAxis>
+  <cs:seriesLine>
+    <cs:lnRef idx="0"/>
+    <cs:fillRef idx="0"/>
+    <cs:effectRef idx="0"/>
+    <cs:fontRef idx="minor">
+      <a:schemeClr val="tx1"/>
+    </cs:fontRef>
+    <cs:spPr>
+      <a:ln w="9525" cap="flat" cmpd="sng" algn="ctr">
+        <a:solidFill>
+          <a:schemeClr val="tx1">
+            <a:lumMod val="35000"/>
+            <a:lumOff val="65000"/>
+          </a:schemeClr>
+        </a:solidFill>
+        <a:round/>
+      </a:ln>
+    </cs:spPr>
+  </cs:seriesLine>
+  <cs:title>
+    <cs:lnRef idx="0"/>
+    <cs:fillRef idx="0"/>
+    <cs:effectRef idx="0"/>
+    <cs:fontRef idx="minor">
+      <a:schemeClr val="tx1">
+        <a:lumMod val="65000"/>
+        <a:lumOff val="35000"/>
+      </a:schemeClr>
+    </cs:fontRef>
+    <cs:defRPr sz="1862" b="0" kern="1200" spc="0" baseline="0"/>
+  </cs:title>
+  <cs:trendline>
+    <cs:lnRef idx="0">
+      <cs:styleClr val="auto"/>
+    </cs:lnRef>
+    <cs:fillRef idx="0"/>
+    <cs:effectRef idx="0"/>
+    <cs:fontRef idx="minor">
+      <a:schemeClr val="tx1"/>
+    </cs:fontRef>
+    <cs:spPr>
+      <a:ln w="19050" cap="rnd">
+        <a:solidFill>
+          <a:schemeClr val="phClr"/>
+        </a:solidFill>
+        <a:prstDash val="sysDot"/>
+      </a:ln>
+    </cs:spPr>
+  </cs:trendline>
+  <cs:trendlineLabel>
+    <cs:lnRef idx="0"/>
+    <cs:fillRef idx="0"/>
+    <cs:effectRef idx="0"/>
+    <cs:fontRef idx="minor">
+      <a:schemeClr val="tx1">
+        <a:lumMod val="65000"/>
+        <a:lumOff val="35000"/>
+      </a:schemeClr>
+    </cs:fontRef>
+    <cs:defRPr sz="1197" kern="1200"/>
+  </cs:trendlineLabel>
+  <cs:upBar>
+    <cs:lnRef idx="0"/>
+    <cs:fillRef idx="0"/>
+    <cs:effectRef idx="0"/>
+    <cs:fontRef idx="minor">
+      <a:schemeClr val="tx1"/>
+    </cs:fontRef>
+    <cs:spPr>
+      <a:solidFill>
+        <a:schemeClr val="lt1"/>
+      </a:solidFill>
+      <a:ln w="9525" cap="flat" cmpd="sng" algn="ctr">
+        <a:solidFill>
+          <a:schemeClr val="tx1">
+            <a:lumMod val="65000"/>
+            <a:lumOff val="35000"/>
+          </a:schemeClr>
+        </a:solidFill>
+        <a:round/>
+      </a:ln>
+    </cs:spPr>
+  </cs:upBar>
+  <cs:valueAxis>
+    <cs:lnRef idx="0"/>
+    <cs:fillRef idx="0"/>
+    <cs:effectRef idx="0"/>
+    <cs:fontRef idx="minor">
+      <a:schemeClr val="tx1">
+        <a:lumMod val="65000"/>
+        <a:lumOff val="35000"/>
+      </a:schemeClr>
+    </cs:fontRef>
+    <cs:defRPr sz="1197" kern="1200"/>
+  </cs:valueAxis>
+  <cs:wall>
+    <cs:lnRef idx="0"/>
+    <cs:fillRef idx="0"/>
+    <cs:effectRef idx="0"/>
+    <cs:fontRef idx="minor">
+      <a:schemeClr val="tx1"/>
+    </cs:fontRef>
+    <cs:spPr>
+      <a:noFill/>
+      <a:ln>
+        <a:noFill/>
+      </a:ln>
+    </cs:spPr>
+  </cs:wall>
+</cs:chartStyle>
+</file>
+
+<file path=ppt/charts/style2.xml><?xml version="1.0" encoding="utf-8"?>
+<cs:chartStyle xmlns:cs="http://schemas.microsoft.com/office/drawing/2012/chartStyle" xmlns:a="http://schemas.openxmlformats.org/drawingml/2006/main" id="240">
+  <cs:axisTitle>
+    <cs:lnRef idx="0"/>
+    <cs:fillRef idx="0"/>
+    <cs:effectRef idx="0"/>
+    <cs:fontRef idx="minor">
+      <a:schemeClr val="tx1">
+        <a:lumMod val="65000"/>
+        <a:lumOff val="35000"/>
+      </a:schemeClr>
+    </cs:fontRef>
+    <cs:defRPr sz="1330" kern="1200"/>
+  </cs:axisTitle>
+  <cs:categoryAxis>
+    <cs:lnRef idx="0"/>
+    <cs:fillRef idx="0"/>
+    <cs:effectRef idx="0"/>
+    <cs:fontRef idx="minor">
+      <a:schemeClr val="tx1">
+        <a:lumMod val="65000"/>
+        <a:lumOff val="35000"/>
+      </a:schemeClr>
+    </cs:fontRef>
+    <cs:spPr>
+      <a:ln w="9525" cap="flat" cmpd="sng" algn="ctr">
+        <a:solidFill>
+          <a:schemeClr val="tx1">
+            <a:lumMod val="25000"/>
+            <a:lumOff val="75000"/>
+          </a:schemeClr>
+        </a:solidFill>
+        <a:round/>
+      </a:ln>
+    </cs:spPr>
+    <cs:defRPr sz="1197" kern="1200"/>
+  </cs:categoryAxis>
+  <cs:chartArea mods="allowNoFillOverride allowNoLineOverride">
+    <cs:lnRef idx="0"/>
+    <cs:fillRef idx="0"/>
+    <cs:effectRef idx="0"/>
+    <cs:fontRef idx="minor">
+      <a:schemeClr val="tx1"/>
+    </cs:fontRef>
+    <cs:spPr>
+      <a:solidFill>
+        <a:schemeClr val="bg1"/>
+      </a:solidFill>
+      <a:ln w="9525" cap="flat" cmpd="sng" algn="ctr">
+        <a:solidFill>
+          <a:schemeClr val="tx1">
+            <a:lumMod val="15000"/>
+            <a:lumOff val="85000"/>
+          </a:schemeClr>
+        </a:solidFill>
+        <a:round/>
+      </a:ln>
+    </cs:spPr>
+    <cs:defRPr sz="1330" kern="1200"/>
+  </cs:chartArea>
+  <cs:dataLabel>
+    <cs:lnRef idx="0"/>
+    <cs:fillRef idx="0"/>
+    <cs:effectRef idx="0"/>
+    <cs:fontRef idx="minor">
+      <a:schemeClr val="tx1">
+        <a:lumMod val="75000"/>
+        <a:lumOff val="25000"/>
+      </a:schemeClr>
+    </cs:fontRef>
+    <cs:defRPr sz="1197" kern="1200"/>
+  </cs:dataLabel>
+  <cs:dataLabelCallout>
+    <cs:lnRef idx="0"/>
+    <cs:fillRef idx="0"/>
+    <cs:effectRef idx="0"/>
+    <cs:fontRef idx="minor">
+      <a:schemeClr val="dk1">
+        <a:lumMod val="65000"/>
+        <a:lumOff val="35000"/>
+      </a:schemeClr>
+    </cs:fontRef>
+    <cs:spPr>
+      <a:solidFill>
+        <a:schemeClr val="lt1"/>
+      </a:solidFill>
+      <a:ln>
+        <a:solidFill>
+          <a:schemeClr val="dk1">
+            <a:lumMod val="25000"/>
+            <a:lumOff val="75000"/>
+          </a:schemeClr>
+        </a:solidFill>
+      </a:ln>
+    </cs:spPr>
+    <cs:defRPr sz="1197" kern="1200"/>
+    <cs:bodyPr rot="0" spcFirstLastPara="1" vertOverflow="clip" horzOverflow="clip" vert="horz" wrap="square" lIns="36576" tIns="18288" rIns="36576" bIns="18288" anchor="ctr" anchorCtr="1">
+      <a:spAutoFit/>
+    </cs:bodyPr>
+  </cs:dataLabelCallout>
+  <cs:dataPoint>
+    <cs:lnRef idx="0"/>
+    <cs:fillRef idx="1">
+      <cs:styleClr val="auto"/>
+    </cs:fillRef>
+    <cs:effectRef idx="0"/>
+    <cs:fontRef idx="minor">
+      <a:schemeClr val="tx1"/>
+    </cs:fontRef>
+  </cs:dataPoint>
+  <cs:dataPoint3D>
+    <cs:lnRef idx="0"/>
+    <cs:fillRef idx="1">
+      <cs:styleClr val="auto"/>
+    </cs:fillRef>
+    <cs:effectRef idx="0"/>
+    <cs:fontRef idx="minor">
+      <a:schemeClr val="tx1"/>
+    </cs:fontRef>
+  </cs:dataPoint3D>
+  <cs:dataPointLine>
+    <cs:lnRef idx="0">
+      <cs:styleClr val="auto"/>
+    </cs:lnRef>
+    <cs:fillRef idx="1"/>
+    <cs:effectRef idx="0"/>
+    <cs:fontRef idx="minor">
+      <a:schemeClr val="tx1"/>
+    </cs:fontRef>
+    <cs:spPr>
+      <a:ln w="19050" cap="rnd">
+        <a:solidFill>
+          <a:schemeClr val="phClr"/>
+        </a:solidFill>
+        <a:round/>
+      </a:ln>
+    </cs:spPr>
+  </cs:dataPointLine>
+  <cs:dataPointMarker>
+    <cs:lnRef idx="0">
+      <cs:styleClr val="auto"/>
+    </cs:lnRef>
+    <cs:fillRef idx="1">
+      <cs:styleClr val="auto"/>
+    </cs:fillRef>
+    <cs:effectRef idx="0"/>
+    <cs:fontRef idx="minor">
+      <a:schemeClr val="tx1"/>
+    </cs:fontRef>
+    <cs:spPr>
+      <a:ln w="9525">
+        <a:solidFill>
+          <a:schemeClr val="phClr"/>
+        </a:solidFill>
+      </a:ln>
+    </cs:spPr>
+  </cs:dataPointMarker>
+  <cs:dataPointMarkerLayout symbol="circle" size="5"/>
+  <cs:dataPointWireframe>
+    <cs:lnRef idx="0">
+      <cs:styleClr val="auto"/>
+    </cs:lnRef>
+    <cs:fillRef idx="0"/>
+    <cs:effectRef idx="0"/>
+    <cs:fontRef idx="minor">
+      <a:schemeClr val="dk1"/>
+    </cs:fontRef>
+    <cs:spPr>
+      <a:ln w="9525" cap="rnd">
+        <a:solidFill>
+          <a:schemeClr val="phClr"/>
+        </a:solidFill>
+        <a:round/>
+      </a:ln>
+    </cs:spPr>
+  </cs:dataPointWireframe>
+  <cs:dataTable>
+    <cs:lnRef idx="0"/>
+    <cs:fillRef idx="0"/>
+    <cs:effectRef idx="0"/>
+    <cs:fontRef idx="minor">
+      <a:schemeClr val="tx1">
+        <a:lumMod val="65000"/>
+        <a:lumOff val="35000"/>
+      </a:schemeClr>
+    </cs:fontRef>
+    <cs:spPr>
+      <a:noFill/>
+      <a:ln w="9525" cap="flat" cmpd="sng" algn="ctr">
+        <a:solidFill>
+          <a:schemeClr val="tx1">
+            <a:lumMod val="15000"/>
+            <a:lumOff val="85000"/>
+          </a:schemeClr>
+        </a:solidFill>
+        <a:round/>
+      </a:ln>
+    </cs:spPr>
+    <cs:defRPr sz="1197" kern="1200"/>
+  </cs:dataTable>
+  <cs:downBar>
+    <cs:lnRef idx="0"/>
+    <cs:fillRef idx="0"/>
+    <cs:effectRef idx="0"/>
+    <cs:fontRef idx="minor">
+      <a:schemeClr val="tx1"/>
+    </cs:fontRef>
+    <cs:spPr>
+      <a:solidFill>
+        <a:schemeClr val="dk1">
+          <a:lumMod val="75000"/>
+          <a:lumOff val="25000"/>
+        </a:schemeClr>
+      </a:solidFill>
+      <a:ln w="9525" cap="flat" cmpd="sng" algn="ctr">
+        <a:solidFill>
+          <a:schemeClr val="tx1">
+            <a:lumMod val="65000"/>
+            <a:lumOff val="35000"/>
+          </a:schemeClr>
+        </a:solidFill>
+        <a:round/>
+      </a:ln>
+    </cs:spPr>
+  </cs:downBar>
+  <cs:dropLine>
+    <cs:lnRef idx="0"/>
+    <cs:fillRef idx="0"/>
+    <cs:effectRef idx="0"/>
+    <cs:fontRef idx="minor">
+      <a:schemeClr val="tx1"/>
+    </cs:fontRef>
+    <cs:spPr>
+      <a:ln w="9525" cap="flat" cmpd="sng" algn="ctr">
+        <a:solidFill>
+          <a:schemeClr val="tx1">
+            <a:lumMod val="35000"/>
+            <a:lumOff val="65000"/>
+          </a:schemeClr>
+        </a:solidFill>
+        <a:round/>
+      </a:ln>
+    </cs:spPr>
+  </cs:dropLine>
+  <cs:errorBar>
+    <cs:lnRef idx="0"/>
+    <cs:fillRef idx="0"/>
+    <cs:effectRef idx="0"/>
+    <cs:fontRef idx="minor">
+      <a:schemeClr val="tx1"/>
+    </cs:fontRef>
+    <cs:spPr>
+      <a:ln w="9525" cap="flat" cmpd="sng" algn="ctr">
+        <a:solidFill>
+          <a:schemeClr val="tx1">
+            <a:lumMod val="65000"/>
+            <a:lumOff val="35000"/>
+          </a:schemeClr>
+        </a:solidFill>
+        <a:round/>
+      </a:ln>
+    </cs:spPr>
+  </cs:errorBar>
+  <cs:floor>
+    <cs:lnRef idx="0"/>
+    <cs:fillRef idx="0"/>
+    <cs:effectRef idx="0"/>
+    <cs:fontRef idx="minor">
+      <a:schemeClr val="tx1"/>
+    </cs:fontRef>
+    <cs:spPr>
+      <a:noFill/>
+      <a:ln>
+        <a:noFill/>
+      </a:ln>
+    </cs:spPr>
+  </cs:floor>
+  <cs:gridlineMajor>
+    <cs:lnRef idx="0"/>
+    <cs:fillRef idx="0"/>
+    <cs:effectRef idx="0"/>
+    <cs:fontRef idx="minor">
+      <a:schemeClr val="tx1"/>
+    </cs:fontRef>
+    <cs:spPr>
+      <a:ln w="9525" cap="flat" cmpd="sng" algn="ctr">
+        <a:solidFill>
+          <a:schemeClr val="tx1">
+            <a:lumMod val="15000"/>
+            <a:lumOff val="85000"/>
+          </a:schemeClr>
+        </a:solidFill>
+        <a:round/>
+      </a:ln>
+    </cs:spPr>
+  </cs:gridlineMajor>
+  <cs:gridlineMinor>
+    <cs:lnRef idx="0"/>
+    <cs:fillRef idx="0"/>
+    <cs:effectRef idx="0"/>
+    <cs:fontRef idx="minor">
+      <a:schemeClr val="tx1"/>
+    </cs:fontRef>
+    <cs:spPr>
+      <a:ln w="9525" cap="flat" cmpd="sng" algn="ctr">
+        <a:solidFill>
+          <a:schemeClr val="tx1">
+            <a:lumMod val="5000"/>
+            <a:lumOff val="95000"/>
+          </a:schemeClr>
+        </a:solidFill>
+        <a:round/>
+      </a:ln>
+    </cs:spPr>
+  </cs:gridlineMinor>
+  <cs:hiLoLine>
+    <cs:lnRef idx="0"/>
+    <cs:fillRef idx="0"/>
+    <cs:effectRef idx="0"/>
+    <cs:fontRef idx="minor">
+      <a:schemeClr val="tx1"/>
+    </cs:fontRef>
+    <cs:spPr>
+      <a:ln w="9525" cap="flat" cmpd="sng" algn="ctr">
+        <a:solidFill>
+          <a:schemeClr val="tx1">
+            <a:lumMod val="50000"/>
+            <a:lumOff val="50000"/>
+          </a:schemeClr>
+        </a:solidFill>
+        <a:round/>
+      </a:ln>
+    </cs:spPr>
+  </cs:hiLoLine>
+  <cs:leaderLine>
+    <cs:lnRef idx="0"/>
+    <cs:fillRef idx="0"/>
+    <cs:effectRef idx="0"/>
+    <cs:fontRef idx="minor">
+      <a:schemeClr val="tx1"/>
+    </cs:fontRef>
+    <cs:spPr>
+      <a:ln w="9525" cap="flat" cmpd="sng" algn="ctr">
+        <a:solidFill>
+          <a:schemeClr val="tx1">
+            <a:lumMod val="35000"/>
+            <a:lumOff val="65000"/>
+          </a:schemeClr>
+        </a:solidFill>
+        <a:round/>
+      </a:ln>
+    </cs:spPr>
+  </cs:leaderLine>
+  <cs:legend>
+    <cs:lnRef idx="0"/>
+    <cs:fillRef idx="0"/>
+    <cs:effectRef idx="0"/>
+    <cs:fontRef idx="minor">
+      <a:schemeClr val="tx1">
+        <a:lumMod val="65000"/>
+        <a:lumOff val="35000"/>
+      </a:schemeClr>
+    </cs:fontRef>
+    <cs:defRPr sz="1197" kern="1200"/>
+  </cs:legend>
+  <cs:plotArea mods="allowNoFillOverride allowNoLineOverride">
+    <cs:lnRef idx="0"/>
+    <cs:fillRef idx="0"/>
+    <cs:effectRef idx="0"/>
+    <cs:fontRef idx="minor">
+      <a:schemeClr val="tx1"/>
+    </cs:fontRef>
+  </cs:plotArea>
+  <cs:plotArea3D mods="allowNoFillOverride allowNoLineOverride">
+    <cs:lnRef idx="0"/>
+    <cs:fillRef idx="0"/>
+    <cs:effectRef idx="0"/>
+    <cs:fontRef idx="minor">
+      <a:schemeClr val="tx1"/>
+    </cs:fontRef>
+  </cs:plotArea3D>
+  <cs:seriesAxis>
+    <cs:lnRef idx="0"/>
+    <cs:fillRef idx="0"/>
+    <cs:effectRef idx="0"/>
+    <cs:fontRef idx="minor">
+      <a:schemeClr val="tx1">
+        <a:lumMod val="65000"/>
+        <a:lumOff val="35000"/>
+      </a:schemeClr>
+    </cs:fontRef>
+    <cs:defRPr sz="1197" kern="1200"/>
+  </cs:seriesAxis>
+  <cs:seriesLine>
+    <cs:lnRef idx="0"/>
+    <cs:fillRef idx="0"/>
+    <cs:effectRef idx="0"/>
+    <cs:fontRef idx="minor">
+      <a:schemeClr val="tx1"/>
+    </cs:fontRef>
+    <cs:spPr>
+      <a:ln w="9525" cap="flat" cmpd="sng" algn="ctr">
+        <a:solidFill>
+          <a:schemeClr val="tx1">
+            <a:lumMod val="35000"/>
+            <a:lumOff val="65000"/>
+          </a:schemeClr>
+        </a:solidFill>
+        <a:round/>
+      </a:ln>
+    </cs:spPr>
+  </cs:seriesLine>
+  <cs:title>
+    <cs:lnRef idx="0"/>
+    <cs:fillRef idx="0"/>
+    <cs:effectRef idx="0"/>
+    <cs:fontRef idx="minor">
+      <a:schemeClr val="tx1">
+        <a:lumMod val="65000"/>
+        <a:lumOff val="35000"/>
+      </a:schemeClr>
+    </cs:fontRef>
+    <cs:defRPr sz="1862" b="0" kern="1200" spc="0" baseline="0"/>
+  </cs:title>
+  <cs:trendline>
+    <cs:lnRef idx="0">
+      <cs:styleClr val="auto"/>
+    </cs:lnRef>
+    <cs:fillRef idx="0"/>
+    <cs:effectRef idx="0"/>
+    <cs:fontRef idx="minor">
+      <a:schemeClr val="tx1"/>
+    </cs:fontRef>
+    <cs:spPr>
+      <a:ln w="19050" cap="rnd">
+        <a:solidFill>
+          <a:schemeClr val="phClr"/>
+        </a:solidFill>
+        <a:prstDash val="sysDot"/>
+      </a:ln>
+    </cs:spPr>
+  </cs:trendline>
+  <cs:trendlineLabel>
+    <cs:lnRef idx="0"/>
+    <cs:fillRef idx="0"/>
+    <cs:effectRef idx="0"/>
+    <cs:fontRef idx="minor">
+      <a:schemeClr val="tx1">
+        <a:lumMod val="65000"/>
+        <a:lumOff val="35000"/>
+      </a:schemeClr>
+    </cs:fontRef>
+    <cs:defRPr sz="1197" kern="1200"/>
+  </cs:trendlineLabel>
+  <cs:upBar>
+    <cs:lnRef idx="0"/>
+    <cs:fillRef idx="0"/>
+    <cs:effectRef idx="0"/>
+    <cs:fontRef idx="minor">
+      <a:schemeClr val="tx1"/>
+    </cs:fontRef>
+    <cs:spPr>
+      <a:solidFill>
+        <a:schemeClr val="lt1"/>
+      </a:solidFill>
+      <a:ln w="9525" cap="flat" cmpd="sng" algn="ctr">
+        <a:solidFill>
+          <a:schemeClr val="tx1">
+            <a:lumMod val="65000"/>
+            <a:lumOff val="35000"/>
+          </a:schemeClr>
+        </a:solidFill>
+        <a:round/>
+      </a:ln>
+    </cs:spPr>
+  </cs:upBar>
+  <cs:valueAxis>
+    <cs:lnRef idx="0"/>
+    <cs:fillRef idx="0"/>
+    <cs:effectRef idx="0"/>
+    <cs:fontRef idx="minor">
+      <a:schemeClr val="tx1">
+        <a:lumMod val="65000"/>
+        <a:lumOff val="35000"/>
+      </a:schemeClr>
+    </cs:fontRef>
+    <cs:spPr>
+      <a:ln w="9525" cap="flat" cmpd="sng" algn="ctr">
+        <a:solidFill>
+          <a:schemeClr val="tx1">
+            <a:lumMod val="25000"/>
+            <a:lumOff val="75000"/>
+          </a:schemeClr>
+        </a:solidFill>
+        <a:round/>
+      </a:ln>
+    </cs:spPr>
+    <cs:defRPr sz="1197" kern="1200"/>
+  </cs:valueAxis>
+  <cs:wall>
+    <cs:lnRef idx="0"/>
+    <cs:fillRef idx="0"/>
+    <cs:effectRef idx="0"/>
+    <cs:fontRef idx="minor">
+      <a:schemeClr val="tx1"/>
+    </cs:fontRef>
+    <cs:spPr>
+      <a:noFill/>
+      <a:ln>
+        <a:noFill/>
+      </a:ln>
+    </cs:spPr>
+  </cs:wall>
+</cs:chartStyle>
 </file>
 
 <file path=ppt/comments/modernComment_7BBF578F_ED886971.xml><?xml version="1.0" encoding="utf-8"?>
@@ -16352,7 +18403,7 @@
             <a:pPr algn="ctr"/>
             <a:r>
               <a:rPr lang="es-CL" dirty="0"/>
-              <a:t>Hospital Guillermo Grant Benavente de Concepción</a:t>
+              <a:t>Hospital Guillermo Grant Benavente - Concepción</a:t>
             </a:r>
           </a:p>
         </p:txBody>
@@ -16700,6 +18751,404 @@
           </a:p>
         </p:txBody>
       </p:sp>
+      <p:graphicFrame>
+        <p:nvGraphicFramePr>
+          <p:cNvPr id="9" name="Gráfico 8">
+            <a:extLst>
+              <a:ext uri="{FF2B5EF4-FFF2-40B4-BE49-F238E27FC236}">
+                <a16:creationId xmlns:a16="http://schemas.microsoft.com/office/drawing/2014/main" id="{27A689AB-E356-AD48-26AD-1E51B4471784}"/>
+              </a:ext>
+            </a:extLst>
+          </p:cNvPr>
+          <p:cNvGraphicFramePr/>
+          <p:nvPr>
+            <p:extLst>
+              <p:ext uri="{D42A27DB-BD31-4B8C-83A1-F6EECF244321}">
+                <p14:modId xmlns:p14="http://schemas.microsoft.com/office/powerpoint/2010/main" val="3279126450"/>
+              </p:ext>
+            </p:extLst>
+          </p:nvPr>
+        </p:nvGraphicFramePr>
+        <p:xfrm>
+          <a:off x="191654" y="1951143"/>
+          <a:ext cx="5183910" cy="3464326"/>
+        </p:xfrm>
+        <a:graphic>
+          <a:graphicData uri="http://schemas.openxmlformats.org/drawingml/2006/chart">
+            <c:chart xmlns:c="http://schemas.openxmlformats.org/drawingml/2006/chart" xmlns:r="http://schemas.openxmlformats.org/officeDocument/2006/relationships" r:id="rId4"/>
+          </a:graphicData>
+        </a:graphic>
+      </p:graphicFrame>
+      <p:sp>
+        <p:nvSpPr>
+          <p:cNvPr id="11" name="Rectángulo: esquinas redondeadas 10">
+            <a:extLst>
+              <a:ext uri="{FF2B5EF4-FFF2-40B4-BE49-F238E27FC236}">
+                <a16:creationId xmlns:a16="http://schemas.microsoft.com/office/drawing/2014/main" id="{4AA1D242-C13A-C953-B8BB-2D3FD84E3886}"/>
+              </a:ext>
+            </a:extLst>
+          </p:cNvPr>
+          <p:cNvSpPr/>
+          <p:nvPr/>
+        </p:nvSpPr>
+        <p:spPr>
+          <a:xfrm>
+            <a:off x="361949" y="1158113"/>
+            <a:ext cx="4826578" cy="396240"/>
+          </a:xfrm>
+          <a:prstGeom prst="roundRect">
+            <a:avLst/>
+          </a:prstGeom>
+          <a:solidFill>
+            <a:schemeClr val="tx2">
+              <a:lumMod val="75000"/>
+            </a:schemeClr>
+          </a:solidFill>
+        </p:spPr>
+        <p:style>
+          <a:lnRef idx="2">
+            <a:schemeClr val="accent1">
+              <a:shade val="15000"/>
+            </a:schemeClr>
+          </a:lnRef>
+          <a:fillRef idx="1">
+            <a:schemeClr val="accent1"/>
+          </a:fillRef>
+          <a:effectRef idx="0">
+            <a:schemeClr val="accent1"/>
+          </a:effectRef>
+          <a:fontRef idx="minor">
+            <a:schemeClr val="lt1"/>
+          </a:fontRef>
+        </p:style>
+        <p:txBody>
+          <a:bodyPr rtlCol="0" anchor="ctr"/>
+          <a:lstStyle/>
+          <a:p>
+            <a:pPr algn="ctr"/>
+            <a:r>
+              <a:rPr lang="es-CL" dirty="0"/>
+              <a:t>Importancia de variables en el estudio</a:t>
+            </a:r>
+          </a:p>
+        </p:txBody>
+      </p:sp>
+      <p:sp>
+        <p:nvSpPr>
+          <p:cNvPr id="14" name="Rectángulo: esquinas redondeadas 13">
+            <a:extLst>
+              <a:ext uri="{FF2B5EF4-FFF2-40B4-BE49-F238E27FC236}">
+                <a16:creationId xmlns:a16="http://schemas.microsoft.com/office/drawing/2014/main" id="{E28F0F11-0BFA-9B56-4356-A126EC4BA1B1}"/>
+              </a:ext>
+            </a:extLst>
+          </p:cNvPr>
+          <p:cNvSpPr/>
+          <p:nvPr/>
+        </p:nvSpPr>
+        <p:spPr>
+          <a:xfrm>
+            <a:off x="8057935" y="4647138"/>
+            <a:ext cx="3098569" cy="964530"/>
+          </a:xfrm>
+          <a:prstGeom prst="roundRect">
+            <a:avLst/>
+          </a:prstGeom>
+          <a:solidFill>
+            <a:srgbClr val="00B050"/>
+          </a:solidFill>
+        </p:spPr>
+        <p:style>
+          <a:lnRef idx="2">
+            <a:schemeClr val="accent1">
+              <a:shade val="15000"/>
+            </a:schemeClr>
+          </a:lnRef>
+          <a:fillRef idx="1">
+            <a:schemeClr val="accent1"/>
+          </a:fillRef>
+          <a:effectRef idx="0">
+            <a:schemeClr val="accent1"/>
+          </a:effectRef>
+          <a:fontRef idx="minor">
+            <a:schemeClr val="lt1"/>
+          </a:fontRef>
+        </p:style>
+        <p:txBody>
+          <a:bodyPr rtlCol="0" anchor="ctr"/>
+          <a:lstStyle/>
+          <a:p>
+            <a:pPr algn="ctr"/>
+            <a:r>
+              <a:rPr lang="es-CL" dirty="0"/>
+              <a:t>Estas 4 variables nuevas mejoran la predicción mas allá del protocolo GES actual</a:t>
+            </a:r>
+          </a:p>
+        </p:txBody>
+      </p:sp>
+      <p:sp>
+        <p:nvSpPr>
+          <p:cNvPr id="15" name="Rectángulo: esquinas redondeadas 14">
+            <a:extLst>
+              <a:ext uri="{FF2B5EF4-FFF2-40B4-BE49-F238E27FC236}">
+                <a16:creationId xmlns:a16="http://schemas.microsoft.com/office/drawing/2014/main" id="{9B5BB754-C4E0-BF2D-5493-A81F83D4EBA5}"/>
+              </a:ext>
+            </a:extLst>
+          </p:cNvPr>
+          <p:cNvSpPr/>
+          <p:nvPr/>
+        </p:nvSpPr>
+        <p:spPr>
+          <a:xfrm>
+            <a:off x="5596883" y="1140038"/>
+            <a:ext cx="2459535" cy="2503707"/>
+          </a:xfrm>
+          <a:prstGeom prst="roundRect">
+            <a:avLst/>
+          </a:prstGeom>
+          <a:solidFill>
+            <a:schemeClr val="tx2">
+              <a:lumMod val="75000"/>
+            </a:schemeClr>
+          </a:solidFill>
+        </p:spPr>
+        <p:style>
+          <a:lnRef idx="2">
+            <a:schemeClr val="accent1">
+              <a:shade val="15000"/>
+            </a:schemeClr>
+          </a:lnRef>
+          <a:fillRef idx="1">
+            <a:schemeClr val="accent1"/>
+          </a:fillRef>
+          <a:effectRef idx="0">
+            <a:schemeClr val="accent1"/>
+          </a:effectRef>
+          <a:fontRef idx="minor">
+            <a:schemeClr val="lt1"/>
+          </a:fontRef>
+        </p:style>
+        <p:txBody>
+          <a:bodyPr rtlCol="0" anchor="t"/>
+          <a:lstStyle/>
+          <a:p>
+            <a:pPr algn="ctr"/>
+            <a:r>
+              <a:rPr lang="es-CL" dirty="0"/>
+              <a:t>Variables GES </a:t>
+            </a:r>
+          </a:p>
+          <a:p>
+            <a:pPr algn="ctr"/>
+            <a:r>
+              <a:rPr lang="es-CL" dirty="0"/>
+              <a:t>(ya en protocolo)</a:t>
+            </a:r>
+          </a:p>
+          <a:p>
+            <a:pPr algn="ctr"/>
+            <a:endParaRPr lang="es-CL" dirty="0"/>
+          </a:p>
+          <a:p>
+            <a:pPr marL="285750" indent="-285750">
+              <a:buFont typeface="Wingdings" panose="05000000000000000000" pitchFamily="2" charset="2"/>
+              <a:buChar char="ü"/>
+            </a:pPr>
+            <a:r>
+              <a:rPr lang="es-CL" dirty="0"/>
+              <a:t>Sangrado GI</a:t>
+            </a:r>
+          </a:p>
+          <a:p>
+            <a:pPr marL="285750" indent="-285750">
+              <a:buFont typeface="Wingdings" panose="05000000000000000000" pitchFamily="2" charset="2"/>
+              <a:buChar char="ü"/>
+            </a:pPr>
+            <a:r>
+              <a:rPr lang="es-CL" dirty="0"/>
+              <a:t>Edad</a:t>
+            </a:r>
+          </a:p>
+          <a:p>
+            <a:pPr marL="285750" indent="-285750">
+              <a:buFont typeface="Wingdings" panose="05000000000000000000" pitchFamily="2" charset="2"/>
+              <a:buChar char="ü"/>
+            </a:pPr>
+            <a:r>
+              <a:rPr lang="es-CL" dirty="0"/>
+              <a:t>Diarrea</a:t>
+            </a:r>
+          </a:p>
+          <a:p>
+            <a:pPr marL="285750" indent="-285750">
+              <a:buFont typeface="Wingdings" panose="05000000000000000000" pitchFamily="2" charset="2"/>
+              <a:buChar char="ü"/>
+            </a:pPr>
+            <a:r>
+              <a:rPr lang="es-CL" dirty="0"/>
+              <a:t>Masa rectal</a:t>
+            </a:r>
+          </a:p>
+          <a:p>
+            <a:pPr marL="285750" indent="-285750">
+              <a:buFont typeface="Wingdings" panose="05000000000000000000" pitchFamily="2" charset="2"/>
+              <a:buChar char="ü"/>
+            </a:pPr>
+            <a:r>
+              <a:rPr lang="es-CL" dirty="0"/>
+              <a:t>Anemia</a:t>
+            </a:r>
+          </a:p>
+        </p:txBody>
+      </p:sp>
+      <p:sp>
+        <p:nvSpPr>
+          <p:cNvPr id="16" name="Rectángulo: esquinas redondeadas 15">
+            <a:extLst>
+              <a:ext uri="{FF2B5EF4-FFF2-40B4-BE49-F238E27FC236}">
+                <a16:creationId xmlns:a16="http://schemas.microsoft.com/office/drawing/2014/main" id="{4DEB628B-5BF1-D561-1E57-74849FAE4402}"/>
+              </a:ext>
+            </a:extLst>
+          </p:cNvPr>
+          <p:cNvSpPr/>
+          <p:nvPr/>
+        </p:nvSpPr>
+        <p:spPr>
+          <a:xfrm>
+            <a:off x="8277737" y="1140038"/>
+            <a:ext cx="2611936" cy="2503706"/>
+          </a:xfrm>
+          <a:prstGeom prst="roundRect">
+            <a:avLst/>
+          </a:prstGeom>
+          <a:solidFill>
+            <a:srgbClr val="00B050"/>
+          </a:solidFill>
+        </p:spPr>
+        <p:style>
+          <a:lnRef idx="2">
+            <a:schemeClr val="accent1">
+              <a:shade val="15000"/>
+            </a:schemeClr>
+          </a:lnRef>
+          <a:fillRef idx="1">
+            <a:schemeClr val="accent1"/>
+          </a:fillRef>
+          <a:effectRef idx="0">
+            <a:schemeClr val="accent1"/>
+          </a:effectRef>
+          <a:fontRef idx="minor">
+            <a:schemeClr val="lt1"/>
+          </a:fontRef>
+        </p:style>
+        <p:txBody>
+          <a:bodyPr rtlCol="0" anchor="t"/>
+          <a:lstStyle/>
+          <a:p>
+            <a:pPr algn="ctr"/>
+            <a:r>
+              <a:rPr lang="es-CL" dirty="0"/>
+              <a:t>Variables nuevas </a:t>
+            </a:r>
+          </a:p>
+          <a:p>
+            <a:pPr algn="ctr"/>
+            <a:r>
+              <a:rPr lang="es-CL" dirty="0"/>
+              <a:t>(no están en protocolo)</a:t>
+            </a:r>
+          </a:p>
+          <a:p>
+            <a:pPr algn="ctr"/>
+            <a:endParaRPr lang="es-CL" dirty="0"/>
+          </a:p>
+          <a:p>
+            <a:pPr marL="285750" indent="-285750">
+              <a:buFont typeface="Wingdings" panose="05000000000000000000" pitchFamily="2" charset="2"/>
+              <a:buChar char="ü"/>
+            </a:pPr>
+            <a:r>
+              <a:rPr lang="es-CL" dirty="0"/>
+              <a:t>Tomografía CT</a:t>
+            </a:r>
+          </a:p>
+          <a:p>
+            <a:pPr marL="285750" indent="-285750">
+              <a:buFont typeface="Wingdings" panose="05000000000000000000" pitchFamily="2" charset="2"/>
+              <a:buChar char="ü"/>
+            </a:pPr>
+            <a:r>
+              <a:rPr lang="es-CL" dirty="0"/>
+              <a:t>Ecografía</a:t>
+            </a:r>
+          </a:p>
+          <a:p>
+            <a:pPr marL="285750" indent="-285750">
+              <a:buFont typeface="Wingdings" panose="05000000000000000000" pitchFamily="2" charset="2"/>
+              <a:buChar char="ü"/>
+            </a:pPr>
+            <a:r>
+              <a:rPr lang="es-CL" dirty="0"/>
+              <a:t>Condición general</a:t>
+            </a:r>
+          </a:p>
+          <a:p>
+            <a:pPr marL="285750" indent="-285750">
+              <a:buFont typeface="Wingdings" panose="05000000000000000000" pitchFamily="2" charset="2"/>
+              <a:buChar char="ü"/>
+            </a:pPr>
+            <a:r>
+              <a:rPr lang="es-CL" dirty="0"/>
+              <a:t>Sexo</a:t>
+            </a:r>
+          </a:p>
+        </p:txBody>
+      </p:sp>
+      <p:sp>
+        <p:nvSpPr>
+          <p:cNvPr id="17" name="Flecha: hacia abajo 16">
+            <a:extLst>
+              <a:ext uri="{FF2B5EF4-FFF2-40B4-BE49-F238E27FC236}">
+                <a16:creationId xmlns:a16="http://schemas.microsoft.com/office/drawing/2014/main" id="{FB1C4D6A-30F4-A3F3-9E2D-227C009BEDEC}"/>
+              </a:ext>
+            </a:extLst>
+          </p:cNvPr>
+          <p:cNvSpPr/>
+          <p:nvPr/>
+        </p:nvSpPr>
+        <p:spPr>
+          <a:xfrm rot="10800000">
+            <a:off x="9337963" y="3828989"/>
+            <a:ext cx="526473" cy="632905"/>
+          </a:xfrm>
+          <a:prstGeom prst="downArrow">
+            <a:avLst/>
+          </a:prstGeom>
+        </p:spPr>
+        <p:style>
+          <a:lnRef idx="2">
+            <a:schemeClr val="accent1">
+              <a:shade val="15000"/>
+            </a:schemeClr>
+          </a:lnRef>
+          <a:fillRef idx="1">
+            <a:schemeClr val="accent1"/>
+          </a:fillRef>
+          <a:effectRef idx="0">
+            <a:schemeClr val="accent1"/>
+          </a:effectRef>
+          <a:fontRef idx="minor">
+            <a:schemeClr val="lt1"/>
+          </a:fontRef>
+        </p:style>
+        <p:txBody>
+          <a:bodyPr rtlCol="0" anchor="ctr"/>
+          <a:lstStyle/>
+          <a:p>
+            <a:pPr algn="ctr"/>
+            <a:endParaRPr lang="es-CL"/>
+          </a:p>
+        </p:txBody>
+      </p:sp>
     </p:spTree>
     <p:extLst>
       <p:ext uri="{BB962C8B-B14F-4D97-AF65-F5344CB8AC3E}">
@@ -17038,6 +19487,87 @@
           </a:p>
         </p:txBody>
       </p:sp>
+      <p:sp>
+        <p:nvSpPr>
+          <p:cNvPr id="6" name="Rectángulo: esquinas redondeadas 5">
+            <a:extLst>
+              <a:ext uri="{FF2B5EF4-FFF2-40B4-BE49-F238E27FC236}">
+                <a16:creationId xmlns:a16="http://schemas.microsoft.com/office/drawing/2014/main" id="{03506068-93DC-573F-7C5C-9E058AE5F1B9}"/>
+              </a:ext>
+            </a:extLst>
+          </p:cNvPr>
+          <p:cNvSpPr/>
+          <p:nvPr/>
+        </p:nvSpPr>
+        <p:spPr>
+          <a:xfrm>
+            <a:off x="361949" y="1111047"/>
+            <a:ext cx="3545033" cy="396240"/>
+          </a:xfrm>
+          <a:prstGeom prst="roundRect">
+            <a:avLst/>
+          </a:prstGeom>
+          <a:solidFill>
+            <a:schemeClr val="tx2">
+              <a:lumMod val="75000"/>
+            </a:schemeClr>
+          </a:solidFill>
+        </p:spPr>
+        <p:style>
+          <a:lnRef idx="2">
+            <a:schemeClr val="accent1">
+              <a:shade val="15000"/>
+            </a:schemeClr>
+          </a:lnRef>
+          <a:fillRef idx="1">
+            <a:schemeClr val="accent1"/>
+          </a:fillRef>
+          <a:effectRef idx="0">
+            <a:schemeClr val="accent1"/>
+          </a:effectRef>
+          <a:fontRef idx="minor">
+            <a:schemeClr val="lt1"/>
+          </a:fontRef>
+        </p:style>
+        <p:txBody>
+          <a:bodyPr rtlCol="0" anchor="ctr"/>
+          <a:lstStyle/>
+          <a:p>
+            <a:r>
+              <a:rPr lang="es-CL" dirty="0"/>
+              <a:t>Rendimiento de modelos</a:t>
+            </a:r>
+          </a:p>
+        </p:txBody>
+      </p:sp>
+      <p:graphicFrame>
+        <p:nvGraphicFramePr>
+          <p:cNvPr id="11" name="Gráfico 10">
+            <a:extLst>
+              <a:ext uri="{FF2B5EF4-FFF2-40B4-BE49-F238E27FC236}">
+                <a16:creationId xmlns:a16="http://schemas.microsoft.com/office/drawing/2014/main" id="{773D3929-A1A5-4220-7E63-609DD2149BBD}"/>
+              </a:ext>
+            </a:extLst>
+          </p:cNvPr>
+          <p:cNvGraphicFramePr/>
+          <p:nvPr>
+            <p:extLst>
+              <p:ext uri="{D42A27DB-BD31-4B8C-83A1-F6EECF244321}">
+                <p14:modId xmlns:p14="http://schemas.microsoft.com/office/powerpoint/2010/main" val="482173634"/>
+              </p:ext>
+            </p:extLst>
+          </p:nvPr>
+        </p:nvGraphicFramePr>
+        <p:xfrm>
+          <a:off x="2519905" y="2005410"/>
+          <a:ext cx="6195728" cy="3652396"/>
+        </p:xfrm>
+        <a:graphic>
+          <a:graphicData uri="http://schemas.openxmlformats.org/drawingml/2006/chart">
+            <c:chart xmlns:c="http://schemas.openxmlformats.org/drawingml/2006/chart" xmlns:r="http://schemas.openxmlformats.org/officeDocument/2006/relationships" r:id="rId4"/>
+          </a:graphicData>
+        </a:graphic>
+      </p:graphicFrame>
     </p:spTree>
     <p:extLst>
       <p:ext uri="{BB962C8B-B14F-4D97-AF65-F5344CB8AC3E}">

</xml_diff>

<commit_message>
vault backup: 2025-11-17 03:51:55
</commit_message>
<xml_diff>
--- a/material/PRESENTACION/cienciadedatosaplicada_investigacion.pptx
+++ b/material/PRESENTACION/cienciadedatosaplicada_investigacion.pptx
@@ -1099,9 +1099,9 @@
         <c:manualLayout>
           <c:xMode val="edge"/>
           <c:yMode val="edge"/>
-          <c:x val="0.6732647558923448"/>
-          <c:y val="3.8285430697906471E-2"/>
-          <c:w val="0.1763308249810687"/>
+          <c:x val="0.74006174778798239"/>
+          <c:y val="0.30628344558325177"/>
+          <c:w val="0.22357743341176989"/>
           <c:h val="0.29380149079548157"/>
         </c:manualLayout>
       </c:layout>
@@ -4264,6 +4264,44 @@
 </p188:cmLst>
 </file>
 
+<file path=ppt/comments/modernComment_7BBF5798_F299D2FB.xml><?xml version="1.0" encoding="utf-8"?>
+<p188:cmLst xmlns:a="http://schemas.openxmlformats.org/drawingml/2006/main" xmlns:r="http://schemas.openxmlformats.org/officeDocument/2006/relationships" xmlns:p188="http://schemas.microsoft.com/office/powerpoint/2018/8/main">
+  <p188:cm id="{FBFB5005-5FDD-4E43-9589-016AB65068D2}" authorId="{F41D8B98-483F-74EF-7ECF-E3886A2D2BF2}" created="2025-11-17T06:22:49.824">
+    <pc:sldMkLst xmlns:pc="http://schemas.microsoft.com/office/powerpoint/2013/main/command">
+      <pc:docMk/>
+      <pc:sldMk cId="4070167291" sldId="2076137368"/>
+    </pc:sldMkLst>
+    <p188:txBody>
+      <a:bodyPr/>
+      <a:lstStyle/>
+      <a:p>
+        <a:r>
+          <a:rPr lang="es-CL"/>
+          <a:t>En este primer resultado vemos el análisis de importancia de variables 
+del modelo predictivo.
+De 16 variables iniciales, el modelo identificó 9 ESTADÍSTICAMENTE 
+SIGNIFICATIVAS, ordenadas aquí según su poder predictivo.
+Las variables con MAYOR IMPORTANCIA son el sangrado gastrointestinal 
+y la tomografía computarizada.
+Lo relevante desde ciencia de datos es la comparación con el protocolo 
+GES actual:
+En AZUL vemos las 5 variables que YA están en el protocolo GES y que 
+el modelo validó como importantes.
+En VERDE están las 4 VARIABLES NUEVAS que el modelo identificó pero 
+que NO están actualmente en el protocolo GES.
+Estas 4 variables adicionales - especialmente las imagenológicas como 
+TAC y ecografía - mejoran la capacidad predictiva del modelo en 5 puntos 
+de AUC, pasando de 0,81 a 0,86.
+Esto demuestra cómo el análisis de datos puede optimizar protocolos 
+clínicos existentes identificando variables relevantes que antes 
+no se consideraban.</a:t>
+        </a:r>
+      </a:p>
+    </p188:txBody>
+  </p188:cm>
+</p188:cmLst>
+</file>
+
 <file path=ppt/diagrams/colors1.xml><?xml version="1.0" encoding="utf-8"?>
 <dgm:colorsDef xmlns:dgm="http://schemas.openxmlformats.org/drawingml/2006/diagram" xmlns:a="http://schemas.openxmlformats.org/drawingml/2006/main" uniqueId="urn:microsoft.com/office/officeart/2005/8/colors/accent1_2">
   <dgm:title val=""/>
@@ -6071,7 +6109,7 @@
           </a:r>
           <a:r>
             <a:rPr lang="es-MX" sz="1200" b="0" i="0" dirty="0"/>
-            <a:t> que estime el riesgo de CRC basándose en síntomas y hallazgos clínicos.</a:t>
+            <a:t> que estime el riesgo de CCR basándose en síntomas y hallazgos clínicos.</a:t>
           </a:r>
           <a:endParaRPr lang="es-CL" sz="1200" dirty="0"/>
         </a:p>
@@ -6155,7 +6193,7 @@
           </a:r>
           <a:r>
             <a:rPr lang="es-MX" sz="1200" b="0" i="0" dirty="0"/>
-            <a:t> más relevantes asociadas al diagnóstico de CRC en pacientes derivados según protocolo GES.</a:t>
+            <a:t> más relevantes asociadas al diagnóstico de CCR en pacientes derivados según protocolo GES.</a:t>
           </a:r>
           <a:endParaRPr lang="es-CL" sz="1200" dirty="0"/>
         </a:p>
@@ -7128,7 +7166,7 @@
           </a:r>
           <a:r>
             <a:rPr lang="es-MX" sz="1200" b="0" i="0" kern="1200" dirty="0"/>
-            <a:t> más relevantes asociadas al diagnóstico de CRC en pacientes derivados según protocolo GES.</a:t>
+            <a:t> más relevantes asociadas al diagnóstico de CCR en pacientes derivados según protocolo GES.</a:t>
           </a:r>
           <a:endParaRPr lang="es-CL" sz="1200" kern="1200" dirty="0"/>
         </a:p>
@@ -7286,7 +7324,7 @@
           </a:r>
           <a:r>
             <a:rPr lang="es-MX" sz="1200" b="0" i="0" kern="1200" dirty="0"/>
-            <a:t> que estime el riesgo de CRC basándose en síntomas y hallazgos clínicos.</a:t>
+            <a:t> que estime el riesgo de CCR basándose en síntomas y hallazgos clínicos.</a:t>
           </a:r>
           <a:endParaRPr lang="es-CL" sz="1200" kern="1200" dirty="0"/>
         </a:p>
@@ -10121,7 +10159,7 @@
           </a:lstStyle>
           <a:p>
             <a:fld id="{B02B2D6A-D10B-4950-84AB-B76A76B41051}" type="datetimeFigureOut">
-              <a:t>16-11-2025</a:t>
+              <a:t>17-11-2025</a:t>
             </a:fld>
             <a:endParaRPr lang="es-ES" dirty="0"/>
           </a:p>
@@ -11965,7 +12003,7 @@
           <a:p>
             <a:fld id="{BDD500C1-193D-466C-BA19-529CD99380B0}" type="datetime1">
               <a:rPr lang="es-CL" smtClean="0"/>
-              <a:t>16-11-2025</a:t>
+              <a:t>17-11-2025</a:t>
             </a:fld>
             <a:endParaRPr lang="es-CL" dirty="0"/>
           </a:p>
@@ -12139,7 +12177,7 @@
           <a:p>
             <a:fld id="{36E3F141-C171-49B6-A38E-06F7755E5F72}" type="datetime1">
               <a:rPr lang="es-CL" smtClean="0"/>
-              <a:t>16-11-2025</a:t>
+              <a:t>17-11-2025</a:t>
             </a:fld>
             <a:endParaRPr lang="es-CL" dirty="0"/>
           </a:p>
@@ -12323,7 +12361,7 @@
           <a:p>
             <a:fld id="{0D3F19D1-0FE2-426C-97DA-07152340B981}" type="datetime1">
               <a:rPr lang="es-CL" smtClean="0"/>
-              <a:t>16-11-2025</a:t>
+              <a:t>17-11-2025</a:t>
             </a:fld>
             <a:endParaRPr lang="es-CL" dirty="0"/>
           </a:p>
@@ -12497,7 +12535,7 @@
           <a:p>
             <a:fld id="{43DAE21C-8755-4C47-9BC8-DA71F60B3971}" type="datetime1">
               <a:rPr lang="es-CL" smtClean="0"/>
-              <a:t>16-11-2025</a:t>
+              <a:t>17-11-2025</a:t>
             </a:fld>
             <a:endParaRPr lang="es-CL" dirty="0"/>
           </a:p>
@@ -12747,7 +12785,7 @@
           <a:p>
             <a:fld id="{8E458565-2487-4F43-8934-E52A058854BE}" type="datetime1">
               <a:rPr lang="es-CL" smtClean="0"/>
-              <a:t>16-11-2025</a:t>
+              <a:t>17-11-2025</a:t>
             </a:fld>
             <a:endParaRPr lang="es-CL" dirty="0"/>
           </a:p>
@@ -12983,7 +13021,7 @@
           <a:p>
             <a:fld id="{96A236D2-A8DB-4873-9CF3-122A89EE4DFB}" type="datetime1">
               <a:rPr lang="es-CL" smtClean="0"/>
-              <a:t>16-11-2025</a:t>
+              <a:t>17-11-2025</a:t>
             </a:fld>
             <a:endParaRPr lang="es-CL" dirty="0"/>
           </a:p>
@@ -13354,7 +13392,7 @@
           <a:p>
             <a:fld id="{A974421A-8B2C-4E77-A0B2-02DE27D440B9}" type="datetime1">
               <a:rPr lang="es-CL" smtClean="0"/>
-              <a:t>16-11-2025</a:t>
+              <a:t>17-11-2025</a:t>
             </a:fld>
             <a:endParaRPr lang="es-CL" dirty="0"/>
           </a:p>
@@ -13476,7 +13514,7 @@
           <a:p>
             <a:fld id="{B1C24CD4-A5D9-4150-A215-8F54EFF05417}" type="datetime1">
               <a:rPr lang="es-CL" smtClean="0"/>
-              <a:t>16-11-2025</a:t>
+              <a:t>17-11-2025</a:t>
             </a:fld>
             <a:endParaRPr lang="es-CL" dirty="0"/>
           </a:p>
@@ -13575,7 +13613,7 @@
           <a:p>
             <a:fld id="{E6A435D1-47BD-487C-A83D-C4C768926A5F}" type="datetime1">
               <a:rPr lang="es-CL" smtClean="0"/>
-              <a:t>16-11-2025</a:t>
+              <a:t>17-11-2025</a:t>
             </a:fld>
             <a:endParaRPr lang="es-CL" dirty="0"/>
           </a:p>
@@ -13856,7 +13894,7 @@
           <a:p>
             <a:fld id="{A683E110-4BCD-4DB5-9BB1-FE2F083E0D4C}" type="datetime1">
               <a:rPr lang="es-CL" smtClean="0"/>
-              <a:t>16-11-2025</a:t>
+              <a:t>17-11-2025</a:t>
             </a:fld>
             <a:endParaRPr lang="es-CL" dirty="0"/>
           </a:p>
@@ -14117,7 +14155,7 @@
           <a:p>
             <a:fld id="{94CACA55-7F1D-4061-AA7B-77C3B9068DBD}" type="datetime1">
               <a:rPr lang="es-CL" smtClean="0"/>
-              <a:t>16-11-2025</a:t>
+              <a:t>17-11-2025</a:t>
             </a:fld>
             <a:endParaRPr lang="es-CL" dirty="0"/>
           </a:p>
@@ -14334,7 +14372,7 @@
           <a:p>
             <a:fld id="{7361D378-4650-4D9F-A1E9-478C02A7DF05}" type="datetime1">
               <a:rPr lang="es-CL" smtClean="0"/>
-              <a:t>16-11-2025</a:t>
+              <a:t>17-11-2025</a:t>
             </a:fld>
             <a:endParaRPr lang="es-CL" dirty="0"/>
           </a:p>
@@ -15765,21 +15803,6 @@
           <a:p>
             <a:r>
               <a:rPr lang="es-MX" sz="1200" dirty="0"/>
-              <a:t>• Modelo interpretable (regresión logística)</a:t>
-            </a:r>
-          </a:p>
-          <a:p>
-            <a:r>
-              <a:rPr lang="es-MX" sz="1200" dirty="0"/>
-              <a:t>  → Aceptable en contexto médico</a:t>
-            </a:r>
-          </a:p>
-          <a:p>
-            <a:endParaRPr lang="es-MX" sz="1200" dirty="0"/>
-          </a:p>
-          <a:p>
-            <a:r>
-              <a:rPr lang="es-MX" sz="1200" dirty="0"/>
               <a:t>• Muy buen rendimiento (AUC = 0,86)</a:t>
             </a:r>
           </a:p>
@@ -17618,7 +17641,7 @@
             <a:pPr algn="just"/>
             <a:r>
               <a:rPr lang="es-MX" dirty="0"/>
-              <a:t>Estudio analizado: Modelo predictivo basado en síntomas para CRC </a:t>
+              <a:t>Estudio analizado: Modelo predictivo basado en síntomas para CCR </a:t>
             </a:r>
           </a:p>
           <a:p>
@@ -18625,7 +18648,7 @@
             </a:pPr>
             <a:r>
               <a:rPr lang="es-CL" dirty="0"/>
-              <a:t>Diagnóstico CRC</a:t>
+              <a:t>Diagnóstico CCR</a:t>
             </a:r>
           </a:p>
         </p:txBody>
@@ -19048,7 +19071,7 @@
           <p:nvPr>
             <p:extLst>
               <p:ext uri="{D42A27DB-BD31-4B8C-83A1-F6EECF244321}">
-                <p14:modId xmlns:p14="http://schemas.microsoft.com/office/powerpoint/2010/main" val="3341564963"/>
+                <p14:modId xmlns:p14="http://schemas.microsoft.com/office/powerpoint/2010/main" val="3765128849"/>
               </p:ext>
             </p:extLst>
           </p:nvPr>
@@ -20262,7 +20285,7 @@
           <a:p>
             <a:r>
               <a:rPr lang="es-CL" sz="1600" dirty="0"/>
-              <a:t>CRC Positivo</a:t>
+              <a:t>CCR Positivo</a:t>
             </a:r>
           </a:p>
         </p:txBody>
@@ -20941,7 +20964,7 @@
           <a:p>
             <a:r>
               <a:rPr lang="es-CL" dirty="0"/>
-              <a:t>Técnica apropiada para variable dependiente binaria (tiene / no tiene CRC).</a:t>
+              <a:t>Técnica apropiada para variable dependiente binaria (tiene / no tiene CCR).</a:t>
             </a:r>
           </a:p>
         </p:txBody>
@@ -21369,7 +21392,7 @@
           <p:nvPr/>
         </p:nvPicPr>
         <p:blipFill>
-          <a:blip r:embed="rId3">
+          <a:blip r:embed="rId4">
             <a:extLst>
               <a:ext uri="{28A0092B-C50C-407E-A947-70E740481C1C}">
                 <a14:useLocalDpi xmlns:a14="http://schemas.microsoft.com/office/drawing/2010/main" val="0"/>
@@ -21586,18 +21609,18 @@
           <p:nvPr>
             <p:extLst>
               <p:ext uri="{D42A27DB-BD31-4B8C-83A1-F6EECF244321}">
-                <p14:modId xmlns:p14="http://schemas.microsoft.com/office/powerpoint/2010/main" val="2117988088"/>
+                <p14:modId xmlns:p14="http://schemas.microsoft.com/office/powerpoint/2010/main" val="2390577820"/>
               </p:ext>
             </p:extLst>
           </p:nvPr>
         </p:nvGraphicFramePr>
         <p:xfrm>
-          <a:off x="191654" y="1951143"/>
-          <a:ext cx="5183910" cy="3464326"/>
+          <a:off x="250239" y="1893138"/>
+          <a:ext cx="5019183" cy="3532232"/>
         </p:xfrm>
         <a:graphic>
           <a:graphicData uri="http://schemas.openxmlformats.org/drawingml/2006/chart">
-            <c:chart xmlns:c="http://schemas.openxmlformats.org/drawingml/2006/chart" xmlns:r="http://schemas.openxmlformats.org/officeDocument/2006/relationships" r:id="rId4"/>
+            <c:chart xmlns:c="http://schemas.openxmlformats.org/drawingml/2006/chart" xmlns:r="http://schemas.openxmlformats.org/officeDocument/2006/relationships" r:id="rId5"/>
           </a:graphicData>
         </a:graphic>
       </p:graphicFrame>
@@ -21657,63 +21680,6 @@
       </p:sp>
       <p:sp>
         <p:nvSpPr>
-          <p:cNvPr id="14" name="Rectángulo: esquinas redondeadas 13">
-            <a:extLst>
-              <a:ext uri="{FF2B5EF4-FFF2-40B4-BE49-F238E27FC236}">
-                <a16:creationId xmlns:a16="http://schemas.microsoft.com/office/drawing/2014/main" id="{E28F0F11-0BFA-9B56-4356-A126EC4BA1B1}"/>
-              </a:ext>
-            </a:extLst>
-          </p:cNvPr>
-          <p:cNvSpPr/>
-          <p:nvPr/>
-        </p:nvSpPr>
-        <p:spPr>
-          <a:xfrm>
-            <a:off x="8057935" y="4647138"/>
-            <a:ext cx="3098569" cy="964530"/>
-          </a:xfrm>
-          <a:prstGeom prst="roundRect">
-            <a:avLst/>
-          </a:prstGeom>
-          <a:solidFill>
-            <a:schemeClr val="accent2">
-              <a:lumMod val="75000"/>
-            </a:schemeClr>
-          </a:solidFill>
-          <a:ln>
-            <a:noFill/>
-          </a:ln>
-        </p:spPr>
-        <p:style>
-          <a:lnRef idx="2">
-            <a:schemeClr val="accent1">
-              <a:shade val="15000"/>
-            </a:schemeClr>
-          </a:lnRef>
-          <a:fillRef idx="1">
-            <a:schemeClr val="accent1"/>
-          </a:fillRef>
-          <a:effectRef idx="0">
-            <a:schemeClr val="accent1"/>
-          </a:effectRef>
-          <a:fontRef idx="minor">
-            <a:schemeClr val="lt1"/>
-          </a:fontRef>
-        </p:style>
-        <p:txBody>
-          <a:bodyPr rtlCol="0" anchor="ctr"/>
-          <a:lstStyle/>
-          <a:p>
-            <a:pPr algn="ctr"/>
-            <a:r>
-              <a:rPr lang="es-CL" dirty="0"/>
-              <a:t>Estas 4 variables nuevas mejoran la predicción mas allá del protocolo GES actual</a:t>
-            </a:r>
-          </a:p>
-        </p:txBody>
-      </p:sp>
-      <p:sp>
-        <p:nvSpPr>
           <p:cNvPr id="15" name="Rectángulo: esquinas redondeadas 14">
             <a:extLst>
               <a:ext uri="{FF2B5EF4-FFF2-40B4-BE49-F238E27FC236}">
@@ -21726,8 +21692,8 @@
         </p:nvSpPr>
         <p:spPr>
           <a:xfrm>
-            <a:off x="5596883" y="1140038"/>
-            <a:ext cx="2459535" cy="2503707"/>
+            <a:off x="5623301" y="1155263"/>
+            <a:ext cx="2707039" cy="1983144"/>
           </a:xfrm>
           <a:prstGeom prst="roundRect">
             <a:avLst/>
@@ -21760,20 +21726,20 @@
           <a:p>
             <a:pPr algn="ctr"/>
             <a:r>
-              <a:rPr lang="es-CL" dirty="0"/>
+              <a:rPr lang="es-CL" sz="1400" dirty="0"/>
               <a:t>Variables GES </a:t>
             </a:r>
           </a:p>
           <a:p>
             <a:pPr algn="ctr"/>
             <a:r>
-              <a:rPr lang="es-CL" dirty="0"/>
+              <a:rPr lang="es-CL" sz="1400" dirty="0"/>
               <a:t>(ya en protocolo)</a:t>
             </a:r>
           </a:p>
           <a:p>
             <a:pPr algn="ctr"/>
-            <a:endParaRPr lang="es-CL" dirty="0"/>
+            <a:endParaRPr lang="es-CL" sz="1400" dirty="0"/>
           </a:p>
           <a:p>
             <a:pPr marL="285750" indent="-285750">
@@ -21781,8 +21747,8 @@
               <a:buChar char="ü"/>
             </a:pPr>
             <a:r>
-              <a:rPr lang="es-CL" dirty="0"/>
-              <a:t>Sangrado GI</a:t>
+              <a:rPr lang="es-CL" sz="1400" dirty="0"/>
+              <a:t>Sangrado GI 	  (p&lt;0,001)</a:t>
             </a:r>
           </a:p>
           <a:p>
@@ -21791,8 +21757,8 @@
               <a:buChar char="ü"/>
             </a:pPr>
             <a:r>
-              <a:rPr lang="es-CL" dirty="0"/>
-              <a:t>Edad</a:t>
+              <a:rPr lang="es-CL" sz="1400" dirty="0"/>
+              <a:t>Edad                    (p=0,002)</a:t>
             </a:r>
           </a:p>
           <a:p>
@@ -21801,8 +21767,8 @@
               <a:buChar char="ü"/>
             </a:pPr>
             <a:r>
-              <a:rPr lang="es-CL" dirty="0"/>
-              <a:t>Diarrea</a:t>
+              <a:rPr lang="es-CL" sz="1400" dirty="0"/>
+              <a:t>Diarrea                (p=0,008)</a:t>
             </a:r>
           </a:p>
           <a:p>
@@ -21811,8 +21777,8 @@
               <a:buChar char="ü"/>
             </a:pPr>
             <a:r>
-              <a:rPr lang="es-CL" dirty="0"/>
-              <a:t>Masa rectal</a:t>
+              <a:rPr lang="es-CL" sz="1400" dirty="0"/>
+              <a:t>Masa rectal        (p=0,003)</a:t>
             </a:r>
           </a:p>
           <a:p>
@@ -21821,8 +21787,8 @@
               <a:buChar char="ü"/>
             </a:pPr>
             <a:r>
-              <a:rPr lang="es-CL" dirty="0"/>
-              <a:t>Anemia</a:t>
+              <a:rPr lang="es-CL" sz="1400" dirty="0"/>
+              <a:t>Anemia               (p=0,011)</a:t>
             </a:r>
           </a:p>
         </p:txBody>
@@ -21841,8 +21807,8 @@
         </p:nvSpPr>
         <p:spPr>
           <a:xfrm>
-            <a:off x="8277737" y="1140038"/>
-            <a:ext cx="2611936" cy="2503706"/>
+            <a:off x="5623300" y="3343921"/>
+            <a:ext cx="2707040" cy="1983143"/>
           </a:xfrm>
           <a:prstGeom prst="roundRect">
             <a:avLst/>
@@ -21878,20 +21844,20 @@
           <a:p>
             <a:pPr algn="ctr"/>
             <a:r>
-              <a:rPr lang="es-CL" dirty="0"/>
+              <a:rPr lang="es-CL" sz="1400" dirty="0"/>
               <a:t>Variables nuevas </a:t>
             </a:r>
           </a:p>
           <a:p>
             <a:pPr algn="ctr"/>
             <a:r>
-              <a:rPr lang="es-CL" dirty="0"/>
+              <a:rPr lang="es-CL" sz="1400" dirty="0"/>
               <a:t>(no están en protocolo)</a:t>
             </a:r>
           </a:p>
           <a:p>
             <a:pPr algn="ctr"/>
-            <a:endParaRPr lang="es-CL" dirty="0"/>
+            <a:endParaRPr lang="es-CL" sz="1400" dirty="0"/>
           </a:p>
           <a:p>
             <a:pPr marL="285750" indent="-285750">
@@ -21899,8 +21865,8 @@
               <a:buChar char="ü"/>
             </a:pPr>
             <a:r>
-              <a:rPr lang="es-CL" dirty="0"/>
-              <a:t>Tomografía CT</a:t>
+              <a:rPr lang="es-CL" sz="1400" dirty="0"/>
+              <a:t>Tomografía CT	      (p&lt;0,001)</a:t>
             </a:r>
           </a:p>
           <a:p>
@@ -21909,8 +21875,8 @@
               <a:buChar char="ü"/>
             </a:pPr>
             <a:r>
-              <a:rPr lang="es-CL" dirty="0"/>
-              <a:t>Ecografía</a:t>
+              <a:rPr lang="es-CL" sz="1400" dirty="0"/>
+              <a:t>Ecografía 	      (p=0,004)</a:t>
             </a:r>
           </a:p>
           <a:p>
@@ -21919,8 +21885,8 @@
               <a:buChar char="ü"/>
             </a:pPr>
             <a:r>
-              <a:rPr lang="es-CL" dirty="0"/>
-              <a:t>Condición general</a:t>
+              <a:rPr lang="es-CL" sz="1400" dirty="0"/>
+              <a:t>Condición general (p=0,015)</a:t>
             </a:r>
           </a:p>
           <a:p>
@@ -21929,18 +21895,18 @@
               <a:buChar char="ü"/>
             </a:pPr>
             <a:r>
-              <a:rPr lang="es-CL" dirty="0"/>
-              <a:t>Sexo</a:t>
+              <a:rPr lang="es-CL" sz="1400" dirty="0"/>
+              <a:t>Sexo                         (p=0,023)</a:t>
             </a:r>
           </a:p>
         </p:txBody>
       </p:sp>
       <p:sp>
         <p:nvSpPr>
-          <p:cNvPr id="17" name="Flecha: hacia abajo 16">
+          <p:cNvPr id="7" name="Rectángulo: esquinas redondeadas 6">
             <a:extLst>
               <a:ext uri="{FF2B5EF4-FFF2-40B4-BE49-F238E27FC236}">
-                <a16:creationId xmlns:a16="http://schemas.microsoft.com/office/drawing/2014/main" id="{FB1C4D6A-30F4-A3F3-9E2D-227C009BEDEC}"/>
+                <a16:creationId xmlns:a16="http://schemas.microsoft.com/office/drawing/2014/main" id="{3E530D21-87C2-C2C3-853D-6020997317FB}"/>
               </a:ext>
             </a:extLst>
           </p:cNvPr>
@@ -21948,15 +21914,118 @@
           <p:nvPr/>
         </p:nvSpPr>
         <p:spPr>
-          <a:xfrm rot="10800000">
-            <a:off x="9337963" y="3828989"/>
-            <a:ext cx="526473" cy="632905"/>
+          <a:xfrm>
+            <a:off x="8556673" y="1111679"/>
+            <a:ext cx="3385088" cy="2351697"/>
           </a:xfrm>
-          <a:prstGeom prst="downArrow">
+          <a:prstGeom prst="roundRect">
             <a:avLst/>
           </a:prstGeom>
           <a:solidFill>
-            <a:schemeClr val="accent2">
+            <a:srgbClr val="C00000"/>
+          </a:solidFill>
+          <a:ln>
+            <a:noFill/>
+          </a:ln>
+        </p:spPr>
+        <p:style>
+          <a:lnRef idx="2">
+            <a:schemeClr val="accent1">
+              <a:shade val="15000"/>
+            </a:schemeClr>
+          </a:lnRef>
+          <a:fillRef idx="1">
+            <a:schemeClr val="accent1"/>
+          </a:fillRef>
+          <a:effectRef idx="0">
+            <a:schemeClr val="accent1"/>
+          </a:effectRef>
+          <a:fontRef idx="minor">
+            <a:schemeClr val="lt1"/>
+          </a:fontRef>
+        </p:style>
+        <p:txBody>
+          <a:bodyPr rtlCol="0" anchor="ctr"/>
+          <a:lstStyle/>
+          <a:p>
+            <a:pPr algn="ctr"/>
+            <a:r>
+              <a:rPr lang="es-CL" sz="1400" dirty="0"/>
+              <a:t> Variables NO Significativas </a:t>
+            </a:r>
+          </a:p>
+          <a:p>
+            <a:endParaRPr lang="es-CL" sz="1400" dirty="0"/>
+          </a:p>
+          <a:p>
+            <a:r>
+              <a:rPr lang="es-CL" sz="1400" dirty="0"/>
+              <a:t>• Pérdida de peso                        (p=0,12)</a:t>
+            </a:r>
+          </a:p>
+          <a:p>
+            <a:r>
+              <a:rPr lang="es-CL" sz="1400" dirty="0"/>
+              <a:t>• Dolor abdominal                       (p=0,28)</a:t>
+            </a:r>
+          </a:p>
+          <a:p>
+            <a:r>
+              <a:rPr lang="es-CL" sz="1400" dirty="0"/>
+              <a:t>• Estreñimiento                            (p=0,45)</a:t>
+            </a:r>
+          </a:p>
+          <a:p>
+            <a:r>
+              <a:rPr lang="es-CL" sz="1400" dirty="0"/>
+              <a:t>• Cambio hábito intestinal         (p=0,33)</a:t>
+            </a:r>
+          </a:p>
+          <a:p>
+            <a:r>
+              <a:rPr lang="es-CL" sz="1400" dirty="0"/>
+              <a:t>• Antecedentes familiares CCR (p=0,19)</a:t>
+            </a:r>
+          </a:p>
+          <a:p>
+            <a:r>
+              <a:rPr lang="es-CL" sz="1400" dirty="0"/>
+              <a:t>• Leucocitosis                                (p=0,51)</a:t>
+            </a:r>
+          </a:p>
+          <a:p>
+            <a:r>
+              <a:rPr lang="es-CL" sz="1400" dirty="0"/>
+              <a:t>• Colonoscopía previa                 (p=0,38)</a:t>
+            </a:r>
+          </a:p>
+          <a:p>
+            <a:endParaRPr lang="es-CL" sz="1400" dirty="0"/>
+          </a:p>
+        </p:txBody>
+      </p:sp>
+      <p:sp>
+        <p:nvSpPr>
+          <p:cNvPr id="12" name="Rectángulo: esquinas redondeadas 11">
+            <a:extLst>
+              <a:ext uri="{FF2B5EF4-FFF2-40B4-BE49-F238E27FC236}">
+                <a16:creationId xmlns:a16="http://schemas.microsoft.com/office/drawing/2014/main" id="{86BECD4D-89F0-B8CA-3B12-16F64FE8AE01}"/>
+              </a:ext>
+            </a:extLst>
+          </p:cNvPr>
+          <p:cNvSpPr/>
+          <p:nvPr/>
+        </p:nvSpPr>
+        <p:spPr>
+          <a:xfrm>
+            <a:off x="3289170" y="5876964"/>
+            <a:ext cx="6195792" cy="333336"/>
+          </a:xfrm>
+          <a:prstGeom prst="roundRect">
+            <a:avLst/>
+          </a:prstGeom>
+          <a:solidFill>
+            <a:schemeClr val="tx2">
               <a:lumMod val="75000"/>
             </a:schemeClr>
           </a:solidFill>
@@ -21978,11 +22047,13 @@
           </a:fontRef>
         </p:style>
         <p:txBody>
-          <a:bodyPr rtlCol="0" anchor="ctr"/>
+          <a:bodyPr rtlCol="0" anchor="t"/>
           <a:lstStyle/>
           <a:p>
-            <a:pPr algn="ctr"/>
-            <a:endParaRPr lang="es-CL" dirty="0"/>
+            <a:r>
+              <a:rPr lang="es-CL" sz="1400" dirty="0"/>
+              <a:t>Criterio: p&lt;0,05 para inclusión en modelo.  (p) Valor de probabilidad.</a:t>
+            </a:r>
           </a:p>
         </p:txBody>
       </p:sp>
@@ -21996,6 +22067,11 @@
   <p:clrMapOvr>
     <a:masterClrMapping/>
   </p:clrMapOvr>
+  <p:extLst>
+    <p:ext uri="{6950BFC3-D8DA-4A85-94F7-54DA5524770B}">
+      <p188:commentRel xmlns:p188="http://schemas.microsoft.com/office/powerpoint/2018/8/main" r:id="rId3"/>
+    </p:ext>
+  </p:extLst>
 </p:sld>
 </file>
 
@@ -22390,14 +22466,14 @@
           <p:nvPr>
             <p:extLst>
               <p:ext uri="{D42A27DB-BD31-4B8C-83A1-F6EECF244321}">
-                <p14:modId xmlns:p14="http://schemas.microsoft.com/office/powerpoint/2010/main" val="3981606597"/>
+                <p14:modId xmlns:p14="http://schemas.microsoft.com/office/powerpoint/2010/main" val="1874811142"/>
               </p:ext>
             </p:extLst>
           </p:nvPr>
         </p:nvGraphicFramePr>
         <p:xfrm>
-          <a:off x="0" y="1757429"/>
-          <a:ext cx="10132681" cy="2653751"/>
+          <a:off x="476250" y="2015728"/>
+          <a:ext cx="7795259" cy="2653751"/>
         </p:xfrm>
         <a:graphic>
           <a:graphicData uri="http://schemas.openxmlformats.org/drawingml/2006/chart">
@@ -22419,7 +22495,7 @@
         </p:nvSpPr>
         <p:spPr>
           <a:xfrm>
-            <a:off x="7952515" y="4077268"/>
+            <a:off x="7518175" y="4109321"/>
             <a:ext cx="4059369" cy="2049012"/>
           </a:xfrm>
           <a:prstGeom prst="roundRect">
@@ -22531,7 +22607,7 @@
         </p:nvSpPr>
         <p:spPr>
           <a:xfrm>
-            <a:off x="9658342" y="1126222"/>
+            <a:off x="8378047" y="1486497"/>
             <a:ext cx="2339623" cy="1627691"/>
           </a:xfrm>
           <a:prstGeom prst="roundRect">
@@ -22635,8 +22711,8 @@
         </p:nvSpPr>
         <p:spPr>
           <a:xfrm>
-            <a:off x="361949" y="4903841"/>
-            <a:ext cx="6340855" cy="1222439"/>
+            <a:off x="361948" y="5335573"/>
+            <a:ext cx="6340855" cy="822760"/>
           </a:xfrm>
           <a:prstGeom prst="roundRect">
             <a:avLst/>
@@ -22683,6 +22759,76 @@
               <a:t>demostrando el valor de incluir estudios de imagen.</a:t>
             </a:r>
             <a:endParaRPr lang="es-CL" dirty="0"/>
+          </a:p>
+        </p:txBody>
+      </p:sp>
+      <p:sp>
+        <p:nvSpPr>
+          <p:cNvPr id="7" name="CuadroTexto 6">
+            <a:extLst>
+              <a:ext uri="{FF2B5EF4-FFF2-40B4-BE49-F238E27FC236}">
+                <a16:creationId xmlns:a16="http://schemas.microsoft.com/office/drawing/2014/main" id="{651024D7-6B47-ABEA-4FF4-F697AB2E399B}"/>
+              </a:ext>
+            </a:extLst>
+          </p:cNvPr>
+          <p:cNvSpPr txBox="1"/>
+          <p:nvPr/>
+        </p:nvSpPr>
+        <p:spPr>
+          <a:xfrm>
+            <a:off x="361948" y="1707951"/>
+            <a:ext cx="1058303" cy="307777"/>
+          </a:xfrm>
+          <a:prstGeom prst="rect">
+            <a:avLst/>
+          </a:prstGeom>
+          <a:noFill/>
+        </p:spPr>
+        <p:txBody>
+          <a:bodyPr wrap="none" rtlCol="0">
+            <a:spAutoFit/>
+          </a:bodyPr>
+          <a:lstStyle/>
+          <a:p>
+            <a:r>
+              <a:rPr lang="es-CL" sz="1400" dirty="0"/>
+              <a:t>Sensibilidad</a:t>
+            </a:r>
+          </a:p>
+        </p:txBody>
+      </p:sp>
+      <p:sp>
+        <p:nvSpPr>
+          <p:cNvPr id="9" name="CuadroTexto 8">
+            <a:extLst>
+              <a:ext uri="{FF2B5EF4-FFF2-40B4-BE49-F238E27FC236}">
+                <a16:creationId xmlns:a16="http://schemas.microsoft.com/office/drawing/2014/main" id="{271D4FB8-4E59-C35A-AC1F-18917D04F603}"/>
+              </a:ext>
+            </a:extLst>
+          </p:cNvPr>
+          <p:cNvSpPr txBox="1"/>
+          <p:nvPr/>
+        </p:nvSpPr>
+        <p:spPr>
+          <a:xfrm>
+            <a:off x="2733435" y="4634232"/>
+            <a:ext cx="1133644" cy="307777"/>
+          </a:xfrm>
+          <a:prstGeom prst="rect">
+            <a:avLst/>
+          </a:prstGeom>
+          <a:noFill/>
+        </p:spPr>
+        <p:txBody>
+          <a:bodyPr wrap="none" rtlCol="0">
+            <a:spAutoFit/>
+          </a:bodyPr>
+          <a:lstStyle/>
+          <a:p>
+            <a:r>
+              <a:rPr lang="es-CL" sz="1400" dirty="0"/>
+              <a:t>Especificidad</a:t>
+            </a:r>
           </a:p>
         </p:txBody>
       </p:sp>

</xml_diff>

<commit_message>
vault backup: 2025-11-17 17:38:56
</commit_message>
<xml_diff>
--- a/material/PRESENTACION/cienciadedatosaplicada_investigacion.pptx
+++ b/material/PRESENTACION/cienciadedatosaplicada_investigacion.pptx
@@ -130,6 +130,7 @@
 <file path=ppt/authors.xml><?xml version="1.0" encoding="utf-8"?>
 <p188:authorLst xmlns:a="http://schemas.openxmlformats.org/drawingml/2006/main" xmlns:r="http://schemas.openxmlformats.org/officeDocument/2006/relationships" xmlns:p188="http://schemas.microsoft.com/office/powerpoint/2018/8/main">
   <p188:author id="{F41D8B98-483F-74EF-7ECF-E3886A2D2BF2}" name="Eric Silva Latorre" initials="ES" userId="74806c10bc288813" providerId="Windows Live"/>
+  <p188:author id="{2F7A7DD7-8D6D-E87B-E17C-620A254122A4}" name="Eric Silva" initials="ES" userId="fc2d2a4317f73617" providerId="Windows Live"/>
   <p188:author id="{FB1660F4-BA9A-82B8-C334-CF91C75A5656}" name="Ruth Marcela Espinosa Sarmiento" initials="RS" userId="S::ruth.espinosa@unab.cl::2acad1b5-36c7-4a86-bd14-a01055d811d0" providerId="AD"/>
 </p188:authorLst>
 </file>
@@ -4295,6 +4296,55 @@
 Esto demuestra cómo el análisis de datos puede optimizar protocolos 
 clínicos existentes identificando variables relevantes que antes 
 no se consideraban.</a:t>
+        </a:r>
+      </a:p>
+    </p188:txBody>
+  </p188:cm>
+</p188:cmLst>
+</file>
+
+<file path=ppt/comments/modernComment_7BBF579B_5282B8A1.xml><?xml version="1.0" encoding="utf-8"?>
+<p188:cmLst xmlns:a="http://schemas.openxmlformats.org/drawingml/2006/main" xmlns:r="http://schemas.openxmlformats.org/officeDocument/2006/relationships" xmlns:p188="http://schemas.microsoft.com/office/powerpoint/2018/8/main">
+  <p188:cm id="{536FBF75-86CF-4B23-A6BC-E7B74F427F37}" authorId="{2F7A7DD7-8D6D-E87B-E17C-620A254122A4}" created="2025-11-17T20:21:26.692">
+    <pc:sldMkLst xmlns:pc="http://schemas.microsoft.com/office/powerpoint/2013/main/command">
+      <pc:docMk/>
+      <pc:sldMk cId="1384298657" sldId="2076137371"/>
+    </pc:sldMkLst>
+    <p188:txBody>
+      <a:bodyPr/>
+      <a:lstStyle/>
+      <a:p>
+        <a:r>
+          <a:rPr lang="es-CL"/>
+          <a:t>En el estudio se crearon dos algoritmos: uno completo con 9 variables y otro simplificado con 7 variables.
+Los resultados muestran que el modelo completo alcanzó AUC 0,86 y el simplificado 0,81, ambos con rendimiento MUY BUENO. La diferencia es mínima: solo 5 puntos.
+Lo valioso detectado es que se puede mantener alta precisión con menos datos. Esto significa mayor eficiencia, mejor escalabilidad y más robustez para implementar en diferentes contextos.
+El estudio confirma el valor de los estudios de imagen pero también revela que el modelo simple es una alternativa práctica. La lección clave: más datos no siempre significa mejores resultados.
+En conclusión, los investigadores demostraron que la ciencia de datos puede crear herramientas diagnósticas tanto precisas como accesibles.</a:t>
+        </a:r>
+      </a:p>
+    </p188:txBody>
+  </p188:cm>
+</p188:cmLst>
+</file>
+
+<file path=ppt/comments/modernComment_7BBF579C_EAEB6B86.xml><?xml version="1.0" encoding="utf-8"?>
+<p188:cmLst xmlns:a="http://schemas.openxmlformats.org/drawingml/2006/main" xmlns:r="http://schemas.openxmlformats.org/officeDocument/2006/relationships" xmlns:p188="http://schemas.microsoft.com/office/powerpoint/2018/8/main">
+  <p188:cm id="{A22AB12F-7491-4FCA-A0DC-121189ACE5E3}" authorId="{2F7A7DD7-8D6D-E87B-E17C-620A254122A4}" created="2025-11-17T20:25:19">
+    <pc:sldMkLst xmlns:pc="http://schemas.microsoft.com/office/powerpoint/2013/main/command">
+      <pc:docMk/>
+      <pc:sldMk cId="3941297030" sldId="2076137372"/>
+    </pc:sldMkLst>
+    <p188:txBody>
+      <a:bodyPr/>
+      <a:lstStyle/>
+      <a:p>
+        <a:r>
+          <a:rPr lang="es-CL"/>
+          <a:t>La realidad es alarmante: 87% de pacientes NO son diagnosticados oportunamente. De los casos detectados, 67% llegan en estadios avanzados cuando ya es tarde.
+El impacto es devastador. Supervivencia a 5 años: 90% si se detecta temprano versus solo 14% en estadio metastásico. La detección temprana multiplica por 6 las probabilidades de vivir.
+Dos de cada tres pacientes pierden la oportunidad de un tratamiento efectivo por diagnóstico tardío. Aquí es donde los algoritmos predictivos que vimos anteriormente se vuelven cruciales: pueden cambiar esta estadística detectando la enfermedad antes de que sea demasiado tarde.
+La ciencia de datos no es solo tecnología - también puede marcar la diferencia entre poder salvar más vidas. Si mejoramos la detección temprana por supuesto.</a:t>
         </a:r>
       </a:p>
     </p188:txBody>
@@ -22196,7 +22246,7 @@
           <p:nvPr/>
         </p:nvPicPr>
         <p:blipFill>
-          <a:blip r:embed="rId3">
+          <a:blip r:embed="rId4">
             <a:extLst>
               <a:ext uri="{28A0092B-C50C-407E-A947-70E740481C1C}">
                 <a14:useLocalDpi xmlns:a14="http://schemas.microsoft.com/office/drawing/2010/main" val="0"/>
@@ -22466,7 +22516,7 @@
           <p:nvPr>
             <p:extLst>
               <p:ext uri="{D42A27DB-BD31-4B8C-83A1-F6EECF244321}">
-                <p14:modId xmlns:p14="http://schemas.microsoft.com/office/powerpoint/2010/main" val="1874811142"/>
+                <p14:modId xmlns:p14="http://schemas.microsoft.com/office/powerpoint/2010/main" val="3061990940"/>
               </p:ext>
             </p:extLst>
           </p:nvPr>
@@ -22477,7 +22527,7 @@
         </p:xfrm>
         <a:graphic>
           <a:graphicData uri="http://schemas.openxmlformats.org/drawingml/2006/chart">
-            <c:chart xmlns:c="http://schemas.openxmlformats.org/drawingml/2006/chart" xmlns:r="http://schemas.openxmlformats.org/officeDocument/2006/relationships" r:id="rId4"/>
+            <c:chart xmlns:c="http://schemas.openxmlformats.org/drawingml/2006/chart" xmlns:r="http://schemas.openxmlformats.org/officeDocument/2006/relationships" r:id="rId5"/>
           </a:graphicData>
         </a:graphic>
       </p:graphicFrame>
@@ -22842,6 +22892,11 @@
   <p:clrMapOvr>
     <a:masterClrMapping/>
   </p:clrMapOvr>
+  <p:extLst>
+    <p:ext uri="{6950BFC3-D8DA-4A85-94F7-54DA5524770B}">
+      <p188:commentRel xmlns:p188="http://schemas.microsoft.com/office/powerpoint/2018/8/main" r:id="rId3"/>
+    </p:ext>
+  </p:extLst>
 </p:sld>
 </file>
 
@@ -22966,7 +23021,7 @@
           <p:nvPr/>
         </p:nvPicPr>
         <p:blipFill>
-          <a:blip r:embed="rId3">
+          <a:blip r:embed="rId4">
             <a:extLst>
               <a:ext uri="{28A0092B-C50C-407E-A947-70E740481C1C}">
                 <a14:useLocalDpi xmlns:a14="http://schemas.microsoft.com/office/drawing/2010/main" val="0"/>
@@ -23247,7 +23302,7 @@
         </p:xfrm>
         <a:graphic>
           <a:graphicData uri="http://schemas.openxmlformats.org/drawingml/2006/chart">
-            <c:chart xmlns:c="http://schemas.openxmlformats.org/drawingml/2006/chart" xmlns:r="http://schemas.openxmlformats.org/officeDocument/2006/relationships" r:id="rId4"/>
+            <c:chart xmlns:c="http://schemas.openxmlformats.org/drawingml/2006/chart" xmlns:r="http://schemas.openxmlformats.org/officeDocument/2006/relationships" r:id="rId5"/>
           </a:graphicData>
         </a:graphic>
       </p:graphicFrame>
@@ -23275,7 +23330,7 @@
         </p:xfrm>
         <a:graphic>
           <a:graphicData uri="http://schemas.openxmlformats.org/drawingml/2006/chart">
-            <c:chart xmlns:c="http://schemas.openxmlformats.org/drawingml/2006/chart" xmlns:r="http://schemas.openxmlformats.org/officeDocument/2006/relationships" r:id="rId5"/>
+            <c:chart xmlns:c="http://schemas.openxmlformats.org/drawingml/2006/chart" xmlns:r="http://schemas.openxmlformats.org/officeDocument/2006/relationships" r:id="rId6"/>
           </a:graphicData>
         </a:graphic>
       </p:graphicFrame>
@@ -23480,6 +23535,11 @@
   <p:clrMapOvr>
     <a:masterClrMapping/>
   </p:clrMapOvr>
+  <p:extLst>
+    <p:ext uri="{6950BFC3-D8DA-4A85-94F7-54DA5524770B}">
+      <p188:commentRel xmlns:p188="http://schemas.microsoft.com/office/powerpoint/2018/8/main" r:id="rId3"/>
+    </p:ext>
+  </p:extLst>
 </p:sld>
 </file>
 

</xml_diff>

<commit_message>
vault backup: 2025-11-17 21:04:25
</commit_message>
<xml_diff>
--- a/material/PRESENTACION/cienciadedatosaplicada_investigacion.pptx
+++ b/material/PRESENTACION/cienciadedatosaplicada_investigacion.pptx
@@ -1298,61 +1298,6 @@
               </c:ext>
             </c:extLst>
           </c:dPt>
-          <c:dLbls>
-            <c:spPr>
-              <a:noFill/>
-              <a:ln>
-                <a:noFill/>
-              </a:ln>
-              <a:effectLst/>
-            </c:spPr>
-            <c:txPr>
-              <a:bodyPr rot="0" spcFirstLastPara="1" vertOverflow="ellipsis" vert="horz" wrap="square" lIns="38100" tIns="19050" rIns="38100" bIns="19050" anchor="ctr" anchorCtr="1">
-                <a:spAutoFit/>
-              </a:bodyPr>
-              <a:lstStyle/>
-              <a:p>
-                <a:pPr>
-                  <a:defRPr sz="1197" b="0" i="0" u="none" strike="noStrike" kern="1200" baseline="0">
-                    <a:solidFill>
-                      <a:schemeClr val="tx1">
-                        <a:lumMod val="75000"/>
-                        <a:lumOff val="25000"/>
-                      </a:schemeClr>
-                    </a:solidFill>
-                    <a:latin typeface="+mn-lt"/>
-                    <a:ea typeface="+mn-ea"/>
-                    <a:cs typeface="+mn-cs"/>
-                  </a:defRPr>
-                </a:pPr>
-                <a:endParaRPr lang="es-CL"/>
-              </a:p>
-            </c:txPr>
-            <c:showLegendKey val="0"/>
-            <c:showVal val="1"/>
-            <c:showCatName val="0"/>
-            <c:showSerName val="0"/>
-            <c:showPercent val="0"/>
-            <c:showBubbleSize val="0"/>
-            <c:showLeaderLines val="1"/>
-            <c:leaderLines>
-              <c:spPr>
-                <a:ln w="9525" cap="flat" cmpd="sng" algn="ctr">
-                  <a:solidFill>
-                    <a:schemeClr val="tx1">
-                      <a:lumMod val="35000"/>
-                      <a:lumOff val="65000"/>
-                    </a:schemeClr>
-                  </a:solidFill>
-                  <a:round/>
-                </a:ln>
-                <a:effectLst/>
-              </c:spPr>
-            </c:leaderLines>
-            <c:extLst>
-              <c:ext xmlns:c15="http://schemas.microsoft.com/office/drawing/2012/chart" uri="{CE6537A1-D6FC-4f65-9D91-7224C49458BB}"/>
-            </c:extLst>
-          </c:dLbls>
           <c:cat>
             <c:strRef>
               <c:f>Hoja1!$A$2:$A$3</c:f>
@@ -1374,10 +1319,10 @@
                 <c:formatCode>0%</c:formatCode>
                 <c:ptCount val="2"/>
                 <c:pt idx="0">
-                  <c:v>0.13</c:v>
+                  <c:v>0.87</c:v>
                 </c:pt>
                 <c:pt idx="1">
-                  <c:v>0.87</c:v>
+                  <c:v>0.13</c:v>
                 </c:pt>
               </c:numCache>
             </c:numRef>
@@ -1473,6 +1418,7 @@
   <c:externalData r:id="rId3">
     <c:autoUpdate val="0"/>
   </c:externalData>
+  <c:userShapes r:id="rId4"/>
 </c:chartSpace>
 </file>
 
@@ -4296,6 +4242,30 @@
 Esto demuestra cómo el análisis de datos puede optimizar protocolos 
 clínicos existentes identificando variables relevantes que antes 
 no se consideraban.</a:t>
+        </a:r>
+      </a:p>
+    </p188:txBody>
+  </p188:cm>
+</p188:cmLst>
+</file>
+
+<file path=ppt/comments/modernComment_7BBF579A_42C758FB.xml><?xml version="1.0" encoding="utf-8"?>
+<p188:cmLst xmlns:a="http://schemas.openxmlformats.org/drawingml/2006/main" xmlns:r="http://schemas.openxmlformats.org/officeDocument/2006/relationships" xmlns:p188="http://schemas.microsoft.com/office/powerpoint/2018/8/main">
+  <p188:cm id="{E44B3A08-7D50-40EE-875A-20B339FC5789}" authorId="{F41D8B98-483F-74EF-7ECF-E3886A2D2BF2}" created="2025-11-17T23:32:23.794">
+    <pc:sldMkLst xmlns:pc="http://schemas.microsoft.com/office/powerpoint/2013/main/command">
+      <pc:docMk/>
+      <pc:sldMk cId="1120360699" sldId="2076137370"/>
+    </pc:sldMkLst>
+    <p188:txBody>
+      <a:bodyPr/>
+      <a:lstStyle/>
+      <a:p>
+        <a:r>
+          <a:rPr lang="es-CL"/>
+          <a:t>1.- En este estudio se descubrieron dos cosas importantes: primero, hay 4 variables que deberían estar en el protocolo pero no lo están. 
+2.- Hay 7 variables que no aportan valor predictivo, algunas de las cuales actualmente se están usando. 
+3.- Se mejora la capacidad de predicción del modelo en casi 20%
+4.- Se cumplen 4 etapas del ciclo de ciencia de datos: problema de negocio, datos y preparación, modelamiento y Evaluación. </a:t>
         </a:r>
       </a:p>
     </p188:txBody>
@@ -10128,6 +10098,101 @@
 </c:userShapes>
 </file>
 
+<file path=ppt/drawings/drawing2.xml><?xml version="1.0" encoding="utf-8"?>
+<c:userShapes xmlns:c="http://schemas.openxmlformats.org/drawingml/2006/chart">
+  <cdr:relSizeAnchor xmlns:cdr="http://schemas.openxmlformats.org/drawingml/2006/chartDrawing">
+    <cdr:from>
+      <cdr:x>0.49244</cdr:x>
+      <cdr:y>0.62231</cdr:y>
+    </cdr:from>
+    <cdr:to>
+      <cdr:x>0.68052</cdr:x>
+      <cdr:y>0.69714</cdr:y>
+    </cdr:to>
+    <cdr:sp macro="" textlink="">
+      <cdr:nvSpPr>
+        <cdr:cNvPr id="2" name="CuadroTexto 1">
+          <a:extLst xmlns:a="http://schemas.openxmlformats.org/drawingml/2006/main">
+            <a:ext uri="{FF2B5EF4-FFF2-40B4-BE49-F238E27FC236}">
+              <a16:creationId xmlns:a16="http://schemas.microsoft.com/office/drawing/2014/main" id="{DFB2C53F-14BF-6667-98E4-65817B95E8D5}"/>
+            </a:ext>
+          </a:extLst>
+        </cdr:cNvPr>
+        <cdr:cNvSpPr txBox="1"/>
+      </cdr:nvSpPr>
+      <cdr:spPr>
+        <a:xfrm xmlns:a="http://schemas.openxmlformats.org/drawingml/2006/main">
+          <a:off x="1428431" y="2236797"/>
+          <a:ext cx="545566" cy="268941"/>
+        </a:xfrm>
+        <a:prstGeom xmlns:a="http://schemas.openxmlformats.org/drawingml/2006/main" prst="rect">
+          <a:avLst/>
+        </a:prstGeom>
+      </cdr:spPr>
+      <cdr:txBody>
+        <a:bodyPr xmlns:a="http://schemas.openxmlformats.org/drawingml/2006/main" vertOverflow="clip" wrap="none" rtlCol="0"/>
+        <a:lstStyle xmlns:a="http://schemas.openxmlformats.org/drawingml/2006/main"/>
+        <a:p xmlns:a="http://schemas.openxmlformats.org/drawingml/2006/main">
+          <a:r>
+            <a:rPr lang="es-CL" sz="1400" kern="1200" dirty="0">
+              <a:solidFill>
+                <a:schemeClr val="bg1"/>
+              </a:solidFill>
+            </a:rPr>
+            <a:t>87%</a:t>
+          </a:r>
+        </a:p>
+      </cdr:txBody>
+    </cdr:sp>
+  </cdr:relSizeAnchor>
+  <cdr:relSizeAnchor xmlns:cdr="http://schemas.openxmlformats.org/drawingml/2006/chartDrawing">
+    <cdr:from>
+      <cdr:x>0.32025</cdr:x>
+      <cdr:y>0.25544</cdr:y>
+    </cdr:from>
+    <cdr:to>
+      <cdr:x>0.46595</cdr:x>
+      <cdr:y>0.33454</cdr:y>
+    </cdr:to>
+    <cdr:sp macro="" textlink="">
+      <cdr:nvSpPr>
+        <cdr:cNvPr id="3" name="CuadroTexto 2">
+          <a:extLst xmlns:a="http://schemas.openxmlformats.org/drawingml/2006/main">
+            <a:ext uri="{FF2B5EF4-FFF2-40B4-BE49-F238E27FC236}">
+              <a16:creationId xmlns:a16="http://schemas.microsoft.com/office/drawing/2014/main" id="{C9901E2B-2E97-D439-A2B9-69BE39DA4556}"/>
+            </a:ext>
+          </a:extLst>
+        </cdr:cNvPr>
+        <cdr:cNvSpPr txBox="1"/>
+      </cdr:nvSpPr>
+      <cdr:spPr>
+        <a:xfrm xmlns:a="http://schemas.openxmlformats.org/drawingml/2006/main">
+          <a:off x="928968" y="918130"/>
+          <a:ext cx="422622" cy="284309"/>
+        </a:xfrm>
+        <a:prstGeom xmlns:a="http://schemas.openxmlformats.org/drawingml/2006/main" prst="rect">
+          <a:avLst/>
+        </a:prstGeom>
+      </cdr:spPr>
+      <cdr:txBody>
+        <a:bodyPr xmlns:a="http://schemas.openxmlformats.org/drawingml/2006/main" vertOverflow="clip" wrap="none" rtlCol="0"/>
+        <a:lstStyle xmlns:a="http://schemas.openxmlformats.org/drawingml/2006/main"/>
+        <a:p xmlns:a="http://schemas.openxmlformats.org/drawingml/2006/main">
+          <a:r>
+            <a:rPr lang="es-CL" sz="1400" kern="1200" dirty="0">
+              <a:solidFill>
+                <a:schemeClr val="tx1"/>
+              </a:solidFill>
+            </a:rPr>
+            <a:t>13%</a:t>
+          </a:r>
+        </a:p>
+      </cdr:txBody>
+    </cdr:sp>
+  </cdr:relSizeAnchor>
+</c:userShapes>
+</file>
+
 <file path=ppt/notesMasters/notesMaster1.xml><?xml version="1.0" encoding="utf-8"?>
 <p:notesMaster xmlns:a="http://schemas.openxmlformats.org/drawingml/2006/main" xmlns:r="http://schemas.openxmlformats.org/officeDocument/2006/relationships" xmlns:p="http://schemas.openxmlformats.org/presentationml/2006/main">
   <p:cSld>
@@ -16449,7 +16514,7 @@
           <p:nvPr/>
         </p:nvPicPr>
         <p:blipFill>
-          <a:blip r:embed="rId3">
+          <a:blip r:embed="rId4">
             <a:extLst>
               <a:ext uri="{28A0092B-C50C-407E-A947-70E740481C1C}">
                 <a14:useLocalDpi xmlns:a14="http://schemas.microsoft.com/office/drawing/2010/main" val="0"/>
@@ -16653,6 +16718,528 @@
           </a:p>
         </p:txBody>
       </p:sp>
+      <p:sp>
+        <p:nvSpPr>
+          <p:cNvPr id="6" name="Rectángulo: esquinas redondeadas 5">
+            <a:extLst>
+              <a:ext uri="{FF2B5EF4-FFF2-40B4-BE49-F238E27FC236}">
+                <a16:creationId xmlns:a16="http://schemas.microsoft.com/office/drawing/2014/main" id="{8D4D47E0-2ECA-DFF2-D316-F3A91E20A558}"/>
+              </a:ext>
+            </a:extLst>
+          </p:cNvPr>
+          <p:cNvSpPr/>
+          <p:nvPr/>
+        </p:nvSpPr>
+        <p:spPr>
+          <a:xfrm>
+            <a:off x="2006330" y="1097055"/>
+            <a:ext cx="8179339" cy="4970982"/>
+          </a:xfrm>
+          <a:prstGeom prst="roundRect">
+            <a:avLst/>
+          </a:prstGeom>
+          <a:solidFill>
+            <a:schemeClr val="bg1"/>
+          </a:solidFill>
+          <a:ln>
+            <a:solidFill>
+              <a:schemeClr val="accent1">
+                <a:shade val="15000"/>
+              </a:schemeClr>
+            </a:solidFill>
+          </a:ln>
+        </p:spPr>
+        <p:style>
+          <a:lnRef idx="2">
+            <a:schemeClr val="accent1">
+              <a:shade val="15000"/>
+            </a:schemeClr>
+          </a:lnRef>
+          <a:fillRef idx="1">
+            <a:schemeClr val="accent1"/>
+          </a:fillRef>
+          <a:effectRef idx="0">
+            <a:schemeClr val="accent1"/>
+          </a:effectRef>
+          <a:fontRef idx="minor">
+            <a:schemeClr val="lt1"/>
+          </a:fontRef>
+        </p:style>
+        <p:txBody>
+          <a:bodyPr rtlCol="0" anchor="t"/>
+          <a:lstStyle/>
+          <a:p>
+            <a:r>
+              <a:rPr lang="es-MX" sz="1400" dirty="0">
+                <a:solidFill>
+                  <a:schemeClr val="tx1"/>
+                </a:solidFill>
+              </a:rPr>
+              <a:t>   </a:t>
+            </a:r>
+          </a:p>
+          <a:p>
+            <a:pPr algn="ctr"/>
+            <a:r>
+              <a:rPr lang="es-MX" sz="1400" dirty="0">
+                <a:solidFill>
+                  <a:schemeClr val="tx1"/>
+                </a:solidFill>
+              </a:rPr>
+              <a:t>                                                        </a:t>
+            </a:r>
+          </a:p>
+          <a:p>
+            <a:pPr algn="ctr"/>
+            <a:endParaRPr lang="es-MX" sz="1400" dirty="0">
+              <a:solidFill>
+                <a:schemeClr val="tx1"/>
+              </a:solidFill>
+            </a:endParaRPr>
+          </a:p>
+          <a:p>
+            <a:pPr algn="ctr"/>
+            <a:r>
+              <a:rPr lang="es-MX" sz="1400" dirty="0">
+                <a:solidFill>
+                  <a:schemeClr val="tx1"/>
+                </a:solidFill>
+              </a:rPr>
+              <a:t> </a:t>
+            </a:r>
+          </a:p>
+        </p:txBody>
+      </p:sp>
+      <p:pic>
+        <p:nvPicPr>
+          <p:cNvPr id="9" name="Imagen 8">
+            <a:extLst>
+              <a:ext uri="{FF2B5EF4-FFF2-40B4-BE49-F238E27FC236}">
+                <a16:creationId xmlns:a16="http://schemas.microsoft.com/office/drawing/2014/main" id="{4A594D4B-C525-F809-A838-EEEBEA801C51}"/>
+              </a:ext>
+            </a:extLst>
+          </p:cNvPr>
+          <p:cNvPicPr>
+            <a:picLocks noChangeAspect="1"/>
+          </p:cNvPicPr>
+          <p:nvPr/>
+        </p:nvPicPr>
+        <p:blipFill>
+          <a:blip r:embed="rId5">
+            <a:extLst>
+              <a:ext uri="{28A0092B-C50C-407E-A947-70E740481C1C}">
+                <a14:useLocalDpi xmlns:a14="http://schemas.microsoft.com/office/drawing/2010/main" val="0"/>
+              </a:ext>
+            </a:extLst>
+          </a:blip>
+          <a:stretch>
+            <a:fillRect/>
+          </a:stretch>
+        </p:blipFill>
+        <p:spPr>
+          <a:xfrm>
+            <a:off x="2513421" y="1307478"/>
+            <a:ext cx="1015089" cy="997023"/>
+          </a:xfrm>
+          <a:prstGeom prst="rect">
+            <a:avLst/>
+          </a:prstGeom>
+        </p:spPr>
+      </p:pic>
+      <p:pic>
+        <p:nvPicPr>
+          <p:cNvPr id="12" name="Imagen 11">
+            <a:extLst>
+              <a:ext uri="{FF2B5EF4-FFF2-40B4-BE49-F238E27FC236}">
+                <a16:creationId xmlns:a16="http://schemas.microsoft.com/office/drawing/2014/main" id="{ACA2265E-6715-AC27-605B-5A76AC433102}"/>
+              </a:ext>
+            </a:extLst>
+          </p:cNvPr>
+          <p:cNvPicPr>
+            <a:picLocks noChangeAspect="1"/>
+          </p:cNvPicPr>
+          <p:nvPr/>
+        </p:nvPicPr>
+        <p:blipFill>
+          <a:blip r:embed="rId6">
+            <a:extLst>
+              <a:ext uri="{28A0092B-C50C-407E-A947-70E740481C1C}">
+                <a14:useLocalDpi xmlns:a14="http://schemas.microsoft.com/office/drawing/2010/main" val="0"/>
+              </a:ext>
+            </a:extLst>
+          </a:blip>
+          <a:stretch>
+            <a:fillRect/>
+          </a:stretch>
+        </p:blipFill>
+        <p:spPr>
+          <a:xfrm>
+            <a:off x="2287616" y="2512824"/>
+            <a:ext cx="1292479" cy="1295208"/>
+          </a:xfrm>
+          <a:prstGeom prst="rect">
+            <a:avLst/>
+          </a:prstGeom>
+        </p:spPr>
+      </p:pic>
+      <p:sp>
+        <p:nvSpPr>
+          <p:cNvPr id="13" name="CuadroTexto 12">
+            <a:extLst>
+              <a:ext uri="{FF2B5EF4-FFF2-40B4-BE49-F238E27FC236}">
+                <a16:creationId xmlns:a16="http://schemas.microsoft.com/office/drawing/2014/main" id="{1590354D-FC85-0B52-77D3-FA420A87845D}"/>
+              </a:ext>
+            </a:extLst>
+          </p:cNvPr>
+          <p:cNvSpPr txBox="1"/>
+          <p:nvPr/>
+        </p:nvSpPr>
+        <p:spPr>
+          <a:xfrm>
+            <a:off x="3745784" y="2702815"/>
+            <a:ext cx="6158600" cy="923330"/>
+          </a:xfrm>
+          <a:prstGeom prst="rect">
+            <a:avLst/>
+          </a:prstGeom>
+          <a:noFill/>
+        </p:spPr>
+        <p:txBody>
+          <a:bodyPr wrap="square" rtlCol="0">
+            <a:spAutoFit/>
+          </a:bodyPr>
+          <a:lstStyle/>
+          <a:p>
+            <a:r>
+              <a:rPr lang="es-MX" dirty="0"/>
+              <a:t>Se encontraron 4 variables que el protocolo actual no considera y 7 que no tienen relevancia a la hora de detectar CCR lo cual mejora el nivel predictivo del modelo.</a:t>
+            </a:r>
+            <a:endParaRPr lang="es-CL" dirty="0"/>
+          </a:p>
+        </p:txBody>
+      </p:sp>
+      <p:sp>
+        <p:nvSpPr>
+          <p:cNvPr id="14" name="CuadroTexto 13">
+            <a:extLst>
+              <a:ext uri="{FF2B5EF4-FFF2-40B4-BE49-F238E27FC236}">
+                <a16:creationId xmlns:a16="http://schemas.microsoft.com/office/drawing/2014/main" id="{7DC68EDD-9D59-8218-273C-B0548A876694}"/>
+              </a:ext>
+            </a:extLst>
+          </p:cNvPr>
+          <p:cNvSpPr txBox="1"/>
+          <p:nvPr/>
+        </p:nvSpPr>
+        <p:spPr>
+          <a:xfrm>
+            <a:off x="3754315" y="1642427"/>
+            <a:ext cx="5338921" cy="646331"/>
+          </a:xfrm>
+          <a:prstGeom prst="rect">
+            <a:avLst/>
+          </a:prstGeom>
+          <a:noFill/>
+        </p:spPr>
+        <p:txBody>
+          <a:bodyPr wrap="square" rtlCol="0">
+            <a:spAutoFit/>
+          </a:bodyPr>
+          <a:lstStyle/>
+          <a:p>
+            <a:r>
+              <a:rPr lang="es-MX" dirty="0"/>
+              <a:t>Se analizaron 5 años de datos de más de mil pacientes                                                          </a:t>
+            </a:r>
+          </a:p>
+          <a:p>
+            <a:endParaRPr lang="es-CL" dirty="0"/>
+          </a:p>
+        </p:txBody>
+      </p:sp>
+      <p:pic>
+        <p:nvPicPr>
+          <p:cNvPr id="22" name="Imagen 21">
+            <a:extLst>
+              <a:ext uri="{FF2B5EF4-FFF2-40B4-BE49-F238E27FC236}">
+                <a16:creationId xmlns:a16="http://schemas.microsoft.com/office/drawing/2014/main" id="{B76F36BE-5F53-81BF-0D06-B463DDE82027}"/>
+              </a:ext>
+            </a:extLst>
+          </p:cNvPr>
+          <p:cNvPicPr>
+            <a:picLocks noChangeAspect="1"/>
+          </p:cNvPicPr>
+          <p:nvPr/>
+        </p:nvPicPr>
+        <p:blipFill>
+          <a:blip r:embed="rId7">
+            <a:extLst>
+              <a:ext uri="{28A0092B-C50C-407E-A947-70E740481C1C}">
+                <a14:useLocalDpi xmlns:a14="http://schemas.microsoft.com/office/drawing/2010/main" val="0"/>
+              </a:ext>
+            </a:extLst>
+          </a:blip>
+          <a:stretch>
+            <a:fillRect/>
+          </a:stretch>
+        </p:blipFill>
+        <p:spPr>
+          <a:xfrm>
+            <a:off x="5831085" y="4546786"/>
+            <a:ext cx="544697" cy="363236"/>
+          </a:xfrm>
+          <a:prstGeom prst="rect">
+            <a:avLst/>
+          </a:prstGeom>
+        </p:spPr>
+      </p:pic>
+      <p:pic>
+        <p:nvPicPr>
+          <p:cNvPr id="23" name="Imagen 22">
+            <a:extLst>
+              <a:ext uri="{FF2B5EF4-FFF2-40B4-BE49-F238E27FC236}">
+                <a16:creationId xmlns:a16="http://schemas.microsoft.com/office/drawing/2014/main" id="{BE6D6C57-D715-E7D9-8E4B-7FC66E90701E}"/>
+              </a:ext>
+            </a:extLst>
+          </p:cNvPr>
+          <p:cNvPicPr>
+            <a:picLocks noChangeAspect="1"/>
+          </p:cNvPicPr>
+          <p:nvPr/>
+        </p:nvPicPr>
+        <p:blipFill>
+          <a:blip r:embed="rId7">
+            <a:extLst>
+              <a:ext uri="{28A0092B-C50C-407E-A947-70E740481C1C}">
+                <a14:useLocalDpi xmlns:a14="http://schemas.microsoft.com/office/drawing/2010/main" val="0"/>
+              </a:ext>
+            </a:extLst>
+          </a:blip>
+          <a:stretch>
+            <a:fillRect/>
+          </a:stretch>
+        </p:blipFill>
+        <p:spPr>
+          <a:xfrm>
+            <a:off x="3451746" y="4546786"/>
+            <a:ext cx="544697" cy="363236"/>
+          </a:xfrm>
+          <a:prstGeom prst="rect">
+            <a:avLst/>
+          </a:prstGeom>
+        </p:spPr>
+      </p:pic>
+      <p:sp>
+        <p:nvSpPr>
+          <p:cNvPr id="24" name="CuadroTexto 23">
+            <a:extLst>
+              <a:ext uri="{FF2B5EF4-FFF2-40B4-BE49-F238E27FC236}">
+                <a16:creationId xmlns:a16="http://schemas.microsoft.com/office/drawing/2014/main" id="{C82A0E2D-4EFF-F371-5BEA-7EADF0E2ABDC}"/>
+              </a:ext>
+            </a:extLst>
+          </p:cNvPr>
+          <p:cNvSpPr txBox="1"/>
+          <p:nvPr/>
+        </p:nvSpPr>
+        <p:spPr>
+          <a:xfrm>
+            <a:off x="5082962" y="4190398"/>
+            <a:ext cx="2068195" cy="369332"/>
+          </a:xfrm>
+          <a:prstGeom prst="rect">
+            <a:avLst/>
+          </a:prstGeom>
+          <a:noFill/>
+        </p:spPr>
+        <p:txBody>
+          <a:bodyPr wrap="none" rtlCol="0">
+            <a:spAutoFit/>
+          </a:bodyPr>
+          <a:lstStyle/>
+          <a:p>
+            <a:r>
+              <a:rPr lang="es-CL" dirty="0"/>
+              <a:t>Datos y Preparación</a:t>
+            </a:r>
+          </a:p>
+        </p:txBody>
+      </p:sp>
+      <p:sp>
+        <p:nvSpPr>
+          <p:cNvPr id="25" name="CuadroTexto 24">
+            <a:extLst>
+              <a:ext uri="{FF2B5EF4-FFF2-40B4-BE49-F238E27FC236}">
+                <a16:creationId xmlns:a16="http://schemas.microsoft.com/office/drawing/2014/main" id="{4B8CCF01-B76E-E261-2D82-E75A2715380B}"/>
+              </a:ext>
+            </a:extLst>
+          </p:cNvPr>
+          <p:cNvSpPr txBox="1"/>
+          <p:nvPr/>
+        </p:nvSpPr>
+        <p:spPr>
+          <a:xfrm>
+            <a:off x="2623473" y="4190398"/>
+            <a:ext cx="2201244" cy="369332"/>
+          </a:xfrm>
+          <a:prstGeom prst="rect">
+            <a:avLst/>
+          </a:prstGeom>
+          <a:noFill/>
+        </p:spPr>
+        <p:txBody>
+          <a:bodyPr wrap="none" rtlCol="0">
+            <a:spAutoFit/>
+          </a:bodyPr>
+          <a:lstStyle/>
+          <a:p>
+            <a:r>
+              <a:rPr lang="es-CL" dirty="0"/>
+              <a:t>Problema de Negocio</a:t>
+            </a:r>
+          </a:p>
+        </p:txBody>
+      </p:sp>
+      <p:sp>
+        <p:nvSpPr>
+          <p:cNvPr id="26" name="CuadroTexto 25">
+            <a:extLst>
+              <a:ext uri="{FF2B5EF4-FFF2-40B4-BE49-F238E27FC236}">
+                <a16:creationId xmlns:a16="http://schemas.microsoft.com/office/drawing/2014/main" id="{F2AA34D0-B73E-ED7F-8E36-6BF784028649}"/>
+              </a:ext>
+            </a:extLst>
+          </p:cNvPr>
+          <p:cNvSpPr txBox="1"/>
+          <p:nvPr/>
+        </p:nvSpPr>
+        <p:spPr>
+          <a:xfrm>
+            <a:off x="7667646" y="4190398"/>
+            <a:ext cx="1577676" cy="369332"/>
+          </a:xfrm>
+          <a:prstGeom prst="rect">
+            <a:avLst/>
+          </a:prstGeom>
+          <a:noFill/>
+        </p:spPr>
+        <p:txBody>
+          <a:bodyPr wrap="none" rtlCol="0">
+            <a:spAutoFit/>
+          </a:bodyPr>
+          <a:lstStyle/>
+          <a:p>
+            <a:r>
+              <a:rPr lang="es-CL" dirty="0"/>
+              <a:t>Modelamiento</a:t>
+            </a:r>
+          </a:p>
+        </p:txBody>
+      </p:sp>
+      <p:pic>
+        <p:nvPicPr>
+          <p:cNvPr id="27" name="Imagen 26">
+            <a:extLst>
+              <a:ext uri="{FF2B5EF4-FFF2-40B4-BE49-F238E27FC236}">
+                <a16:creationId xmlns:a16="http://schemas.microsoft.com/office/drawing/2014/main" id="{7231EEDA-6F12-B0D2-FAC6-858F9383DA7B}"/>
+              </a:ext>
+            </a:extLst>
+          </p:cNvPr>
+          <p:cNvPicPr>
+            <a:picLocks noChangeAspect="1"/>
+          </p:cNvPicPr>
+          <p:nvPr/>
+        </p:nvPicPr>
+        <p:blipFill>
+          <a:blip r:embed="rId7">
+            <a:extLst>
+              <a:ext uri="{28A0092B-C50C-407E-A947-70E740481C1C}">
+                <a14:useLocalDpi xmlns:a14="http://schemas.microsoft.com/office/drawing/2010/main" val="0"/>
+              </a:ext>
+            </a:extLst>
+          </a:blip>
+          <a:stretch>
+            <a:fillRect/>
+          </a:stretch>
+        </p:blipFill>
+        <p:spPr>
+          <a:xfrm>
+            <a:off x="8184136" y="4512904"/>
+            <a:ext cx="544697" cy="363236"/>
+          </a:xfrm>
+          <a:prstGeom prst="rect">
+            <a:avLst/>
+          </a:prstGeom>
+        </p:spPr>
+      </p:pic>
+      <p:sp>
+        <p:nvSpPr>
+          <p:cNvPr id="28" name="CuadroTexto 27">
+            <a:extLst>
+              <a:ext uri="{FF2B5EF4-FFF2-40B4-BE49-F238E27FC236}">
+                <a16:creationId xmlns:a16="http://schemas.microsoft.com/office/drawing/2014/main" id="{18703E2F-91B5-B044-7C94-CE6EFE563E77}"/>
+              </a:ext>
+            </a:extLst>
+          </p:cNvPr>
+          <p:cNvSpPr txBox="1"/>
+          <p:nvPr/>
+        </p:nvSpPr>
+        <p:spPr>
+          <a:xfrm>
+            <a:off x="5500323" y="5162771"/>
+            <a:ext cx="1191352" cy="369332"/>
+          </a:xfrm>
+          <a:prstGeom prst="rect">
+            <a:avLst/>
+          </a:prstGeom>
+          <a:noFill/>
+        </p:spPr>
+        <p:txBody>
+          <a:bodyPr wrap="none" rtlCol="0">
+            <a:spAutoFit/>
+          </a:bodyPr>
+          <a:lstStyle/>
+          <a:p>
+            <a:r>
+              <a:rPr lang="es-CL" dirty="0"/>
+              <a:t>Evaluación</a:t>
+            </a:r>
+          </a:p>
+        </p:txBody>
+      </p:sp>
+      <p:pic>
+        <p:nvPicPr>
+          <p:cNvPr id="29" name="Imagen 28">
+            <a:extLst>
+              <a:ext uri="{FF2B5EF4-FFF2-40B4-BE49-F238E27FC236}">
+                <a16:creationId xmlns:a16="http://schemas.microsoft.com/office/drawing/2014/main" id="{B26D6BC1-E1A4-33BF-6D85-998E44802593}"/>
+              </a:ext>
+            </a:extLst>
+          </p:cNvPr>
+          <p:cNvPicPr>
+            <a:picLocks noChangeAspect="1"/>
+          </p:cNvPicPr>
+          <p:nvPr/>
+        </p:nvPicPr>
+        <p:blipFill>
+          <a:blip r:embed="rId7">
+            <a:extLst>
+              <a:ext uri="{28A0092B-C50C-407E-A947-70E740481C1C}">
+                <a14:useLocalDpi xmlns:a14="http://schemas.microsoft.com/office/drawing/2010/main" val="0"/>
+              </a:ext>
+            </a:extLst>
+          </a:blip>
+          <a:stretch>
+            <a:fillRect/>
+          </a:stretch>
+        </p:blipFill>
+        <p:spPr>
+          <a:xfrm>
+            <a:off x="5823650" y="5559422"/>
+            <a:ext cx="544697" cy="363236"/>
+          </a:xfrm>
+          <a:prstGeom prst="rect">
+            <a:avLst/>
+          </a:prstGeom>
+        </p:spPr>
+      </p:pic>
     </p:spTree>
     <p:extLst>
       <p:ext uri="{BB962C8B-B14F-4D97-AF65-F5344CB8AC3E}">
@@ -16663,6 +17250,11 @@
   <p:clrMapOvr>
     <a:masterClrMapping/>
   </p:clrMapOvr>
+  <p:extLst>
+    <p:ext uri="{6950BFC3-D8DA-4A85-94F7-54DA5524770B}">
+      <p188:commentRel xmlns:p188="http://schemas.microsoft.com/office/powerpoint/2018/8/main" r:id="rId3"/>
+    </p:ext>
+  </p:extLst>
 </p:sld>
 </file>
 
@@ -16988,6 +17580,215 @@
               <a:t>Referencias Bibliográficas</a:t>
             </a:r>
             <a:endParaRPr lang="es-CL" dirty="0"/>
+          </a:p>
+        </p:txBody>
+      </p:sp>
+      <p:sp>
+        <p:nvSpPr>
+          <p:cNvPr id="7" name="Rectángulo: esquinas redondeadas 6">
+            <a:extLst>
+              <a:ext uri="{FF2B5EF4-FFF2-40B4-BE49-F238E27FC236}">
+                <a16:creationId xmlns:a16="http://schemas.microsoft.com/office/drawing/2014/main" id="{CFB5B916-0E61-CE3E-500B-D66C78DB20E2}"/>
+              </a:ext>
+            </a:extLst>
+          </p:cNvPr>
+          <p:cNvSpPr/>
+          <p:nvPr/>
+        </p:nvSpPr>
+        <p:spPr>
+          <a:xfrm>
+            <a:off x="2006330" y="2223655"/>
+            <a:ext cx="8179339" cy="2957945"/>
+          </a:xfrm>
+          <a:prstGeom prst="roundRect">
+            <a:avLst/>
+          </a:prstGeom>
+          <a:solidFill>
+            <a:schemeClr val="bg1"/>
+          </a:solidFill>
+          <a:ln>
+            <a:solidFill>
+              <a:schemeClr val="accent1">
+                <a:shade val="15000"/>
+              </a:schemeClr>
+            </a:solidFill>
+          </a:ln>
+        </p:spPr>
+        <p:style>
+          <a:lnRef idx="2">
+            <a:schemeClr val="accent1">
+              <a:shade val="15000"/>
+            </a:schemeClr>
+          </a:lnRef>
+          <a:fillRef idx="1">
+            <a:schemeClr val="accent1"/>
+          </a:fillRef>
+          <a:effectRef idx="0">
+            <a:schemeClr val="accent1"/>
+          </a:effectRef>
+          <a:fontRef idx="minor">
+            <a:schemeClr val="lt1"/>
+          </a:fontRef>
+        </p:style>
+        <p:txBody>
+          <a:bodyPr rtlCol="0" anchor="t"/>
+          <a:lstStyle/>
+          <a:p>
+            <a:pPr marL="285750" indent="-285750">
+              <a:buFont typeface="Arial" panose="020B0604020202020204" pitchFamily="34" charset="0"/>
+              <a:buChar char="•"/>
+            </a:pPr>
+            <a:r>
+              <a:rPr lang="es-MX" sz="1400" dirty="0">
+                <a:solidFill>
+                  <a:schemeClr val="tx1"/>
+                </a:solidFill>
+              </a:rPr>
+              <a:t>Benavides, C., &amp; Alvarado, J. (2025). Modelo predictivo basado en síntomas para el diagnóstico de cáncer colorrectal: Optimización según las directrices de la política pública de salud chilena. Revista Médica De Chile, 153 (03) [citado en Abr 4, 2023]. Recuperado a partir de </a:t>
+            </a:r>
+            <a:r>
+              <a:rPr lang="es-MX" sz="1400" dirty="0">
+                <a:solidFill>
+                  <a:schemeClr val="tx1"/>
+                </a:solidFill>
+                <a:hlinkClick r:id="rId4"/>
+              </a:rPr>
+              <a:t>https://revistamedicadechile.cl/index.php/rmedica/article/view/10992</a:t>
+            </a:r>
+            <a:r>
+              <a:rPr lang="es-MX" sz="1400" dirty="0">
+                <a:solidFill>
+                  <a:schemeClr val="tx1"/>
+                </a:solidFill>
+              </a:rPr>
+              <a:t> </a:t>
+            </a:r>
+          </a:p>
+          <a:p>
+            <a:pPr marL="285750" indent="-285750">
+              <a:buFont typeface="Arial" panose="020B0604020202020204" pitchFamily="34" charset="0"/>
+              <a:buChar char="•"/>
+            </a:pPr>
+            <a:r>
+              <a:rPr lang="es-MX" sz="1400" dirty="0">
+                <a:solidFill>
+                  <a:schemeClr val="tx1"/>
+                </a:solidFill>
+              </a:rPr>
+              <a:t>WHO. Colorectal cancer – IARC. [citado en May 14, 2023]. Recuperado a partir de: </a:t>
+            </a:r>
+            <a:r>
+              <a:rPr lang="es-MX" sz="1400" dirty="0">
+                <a:solidFill>
+                  <a:schemeClr val="tx1"/>
+                </a:solidFill>
+                <a:hlinkClick r:id="rId5"/>
+              </a:rPr>
+              <a:t>https://www.iarc.who.int/cancer-type/colorectal-cancer/</a:t>
+            </a:r>
+            <a:r>
+              <a:rPr lang="es-MX" sz="1400" dirty="0">
+                <a:solidFill>
+                  <a:schemeClr val="tx1"/>
+                </a:solidFill>
+              </a:rPr>
+              <a:t> </a:t>
+            </a:r>
+          </a:p>
+          <a:p>
+            <a:pPr marL="285750" indent="-285750">
+              <a:buFont typeface="Arial" panose="020B0604020202020204" pitchFamily="34" charset="0"/>
+              <a:buChar char="•"/>
+            </a:pPr>
+            <a:r>
+              <a:rPr lang="es-MX" sz="1400" dirty="0">
+                <a:solidFill>
+                  <a:schemeClr val="tx1"/>
+                </a:solidFill>
+              </a:rPr>
+              <a:t>Colorectal cancer trends in Chile: A Latin-American country with marked socioeconomic inequities PLOS ONE. [citado en May 14, 2023]. Recuperado a partir de: </a:t>
+            </a:r>
+            <a:r>
+              <a:rPr lang="es-MX" sz="1400" dirty="0">
+                <a:solidFill>
+                  <a:schemeClr val="tx1"/>
+                </a:solidFill>
+                <a:hlinkClick r:id="rId6"/>
+              </a:rPr>
+              <a:t>https://journals.plos.org/plosone/article?id=10.1371/journal.pone.0271929</a:t>
+            </a:r>
+            <a:endParaRPr lang="es-MX" sz="1400" dirty="0">
+              <a:solidFill>
+                <a:schemeClr val="tx1"/>
+              </a:solidFill>
+            </a:endParaRPr>
+          </a:p>
+          <a:p>
+            <a:pPr marL="285750" indent="-285750">
+              <a:buFont typeface="Arial" panose="020B0604020202020204" pitchFamily="34" charset="0"/>
+              <a:buChar char="•"/>
+            </a:pPr>
+            <a:r>
+              <a:rPr lang="es-MX" sz="1400" dirty="0">
+                <a:solidFill>
+                  <a:schemeClr val="tx1"/>
+                </a:solidFill>
+              </a:rPr>
+              <a:t>Cancer today. [citado en August 9, 2022]. Recuperado a partir de: </a:t>
+            </a:r>
+            <a:r>
+              <a:rPr lang="es-MX" sz="1400" dirty="0">
+                <a:solidFill>
+                  <a:schemeClr val="tx1"/>
+                </a:solidFill>
+                <a:hlinkClick r:id="rId7"/>
+              </a:rPr>
+              <a:t>http://gco.iarc.fr/today/home</a:t>
+            </a:r>
+            <a:r>
+              <a:rPr lang="es-MX" sz="1400" dirty="0">
+                <a:solidFill>
+                  <a:schemeClr val="tx1"/>
+                </a:solidFill>
+              </a:rPr>
+              <a:t> </a:t>
+            </a:r>
+          </a:p>
+          <a:p>
+            <a:pPr marL="285750" indent="-285750">
+              <a:buFont typeface="Arial" panose="020B0604020202020204" pitchFamily="34" charset="0"/>
+              <a:buChar char="•"/>
+            </a:pPr>
+            <a:r>
+              <a:rPr lang="es-MX" sz="1400" dirty="0">
+                <a:solidFill>
+                  <a:schemeClr val="tx1"/>
+                </a:solidFill>
+              </a:rPr>
+              <a:t>Colorectal Cancer Awareness Month 2021–IARC. [citado en September 29, 2021]. Recuperado a partir de: </a:t>
+            </a:r>
+            <a:r>
+              <a:rPr lang="es-MX" sz="1400" dirty="0">
+                <a:solidFill>
+                  <a:schemeClr val="tx1"/>
+                </a:solidFill>
+                <a:hlinkClick r:id="rId8"/>
+              </a:rPr>
+              <a:t>https://www.iarc.who.int/featured- news/ccam2021/</a:t>
+            </a:r>
+            <a:endParaRPr lang="es-MX" sz="1400" dirty="0">
+              <a:solidFill>
+                <a:schemeClr val="tx1"/>
+              </a:solidFill>
+            </a:endParaRPr>
+          </a:p>
+          <a:p>
+            <a:pPr algn="ctr"/>
+            <a:endParaRPr lang="es-MX" sz="1400" dirty="0">
+              <a:solidFill>
+                <a:schemeClr val="tx1"/>
+              </a:solidFill>
+            </a:endParaRPr>
           </a:p>
         </p:txBody>
       </p:sp>
@@ -23291,7 +24092,7 @@
           <p:nvPr>
             <p:extLst>
               <p:ext uri="{D42A27DB-BD31-4B8C-83A1-F6EECF244321}">
-                <p14:modId xmlns:p14="http://schemas.microsoft.com/office/powerpoint/2010/main" val="886338030"/>
+                <p14:modId xmlns:p14="http://schemas.microsoft.com/office/powerpoint/2010/main" val="2631467983"/>
               </p:ext>
             </p:extLst>
           </p:nvPr>

</xml_diff>